<commit_message>
Modified the figure for the percentage of soil saturation
</commit_message>
<xml_diff>
--- a/chapter_03/figures/03_perc_soil_saturation_sr.pptx
+++ b/chapter_03/figures/03_perc_soil_saturation_sr.pptx
@@ -2,12 +2,12 @@
 <file path=ppt/presentation.xml><?xml version="1.0" encoding="utf-8"?>
 <p:presentation xmlns:a="http://schemas.openxmlformats.org/drawingml/2006/main" xmlns:r="http://schemas.openxmlformats.org/officeDocument/2006/relationships" xmlns:p="http://schemas.openxmlformats.org/presentationml/2006/main" saveSubsetFonts="1">
   <p:sldMasterIdLst>
-    <p:sldMasterId id="2147483792" r:id="rId1"/>
+    <p:sldMasterId id="2147483816" r:id="rId1"/>
   </p:sldMasterIdLst>
   <p:sldIdLst>
     <p:sldId id="256" r:id="rId2"/>
   </p:sldIdLst>
-  <p:sldSz cx="6858000" cy="2141538"/>
+  <p:sldSz cx="3311525" cy="4518025"/>
   <p:notesSz cx="6858000" cy="9144000"/>
   <p:defaultTextStyle>
     <a:defPPr>
@@ -115,7 +115,7 @@
 <file path=ppt/revisionInfo.xml><?xml version="1.0" encoding="utf-8"?>
 <p1510:revInfo xmlns:a="http://schemas.openxmlformats.org/drawingml/2006/main" xmlns:r="http://schemas.openxmlformats.org/officeDocument/2006/relationships" xmlns:p1510="http://schemas.microsoft.com/office/powerpoint/2015/10/main">
   <p1510:revLst>
-    <p1510:client id="{0EC97EC2-C770-4AE8-9D0C-3702CDF83D14}" v="2" dt="2025-05-14T22:33:34.258"/>
+    <p1510:client id="{0EC97EC2-C770-4AE8-9D0C-3702CDF83D14}" v="6" dt="2025-05-25T20:56:32.036"/>
   </p1510:revLst>
 </p1510:revInfo>
 </file>
@@ -3757,12 +3757,12 @@
   <pc:docChgLst>
     <pc:chgData name="Fatima Pillosu" userId="a6295d4dc9e22643" providerId="LiveId" clId="{0EC97EC2-C770-4AE8-9D0C-3702CDF83D14}"/>
     <pc:docChg chg="custSel modSld">
-      <pc:chgData name="Fatima Pillosu" userId="a6295d4dc9e22643" providerId="LiveId" clId="{0EC97EC2-C770-4AE8-9D0C-3702CDF83D14}" dt="2025-05-14T22:33:34.258" v="80"/>
+      <pc:chgData name="Fatima Pillosu" userId="a6295d4dc9e22643" providerId="LiveId" clId="{0EC97EC2-C770-4AE8-9D0C-3702CDF83D14}" dt="2025-05-25T20:56:46.429" v="98" actId="1037"/>
       <pc:docMkLst>
         <pc:docMk/>
       </pc:docMkLst>
       <pc:sldChg chg="addSp delSp modSp mod">
-        <pc:chgData name="Fatima Pillosu" userId="a6295d4dc9e22643" providerId="LiveId" clId="{0EC97EC2-C770-4AE8-9D0C-3702CDF83D14}" dt="2025-05-14T22:33:34.258" v="80"/>
+        <pc:chgData name="Fatima Pillosu" userId="a6295d4dc9e22643" providerId="LiveId" clId="{0EC97EC2-C770-4AE8-9D0C-3702CDF83D14}" dt="2025-05-25T20:56:46.429" v="98" actId="1037"/>
         <pc:sldMkLst>
           <pc:docMk/>
           <pc:sldMk cId="1380674543" sldId="256"/>
@@ -3775,324 +3775,972 @@
             <ac:spMk id="2" creationId="{C996CE2F-8644-3836-7699-57AECABC1019}"/>
           </ac:spMkLst>
         </pc:spChg>
-        <pc:spChg chg="add mod">
-          <ac:chgData name="Fatima Pillosu" userId="a6295d4dc9e22643" providerId="LiveId" clId="{0EC97EC2-C770-4AE8-9D0C-3702CDF83D14}" dt="2025-05-14T22:33:34.258" v="80"/>
+        <pc:spChg chg="add del mod">
+          <ac:chgData name="Fatima Pillosu" userId="a6295d4dc9e22643" providerId="LiveId" clId="{0EC97EC2-C770-4AE8-9D0C-3702CDF83D14}" dt="2025-05-25T20:52:53.842" v="81" actId="21"/>
           <ac:spMkLst>
             <pc:docMk/>
             <pc:sldMk cId="1380674543" sldId="256"/>
             <ac:spMk id="5" creationId="{0C7866F8-3D28-D23F-94F4-31434FC45C8D}"/>
           </ac:spMkLst>
         </pc:spChg>
-        <pc:spChg chg="add mod">
-          <ac:chgData name="Fatima Pillosu" userId="a6295d4dc9e22643" providerId="LiveId" clId="{0EC97EC2-C770-4AE8-9D0C-3702CDF83D14}" dt="2025-05-14T22:33:34.258" v="80"/>
+        <pc:spChg chg="add del mod">
+          <ac:chgData name="Fatima Pillosu" userId="a6295d4dc9e22643" providerId="LiveId" clId="{0EC97EC2-C770-4AE8-9D0C-3702CDF83D14}" dt="2025-05-25T20:52:53.842" v="81" actId="21"/>
           <ac:spMkLst>
             <pc:docMk/>
             <pc:sldMk cId="1380674543" sldId="256"/>
             <ac:spMk id="6" creationId="{12F23E37-D850-2205-D764-E65B9EEE2D3F}"/>
           </ac:spMkLst>
         </pc:spChg>
-        <pc:spChg chg="add mod">
-          <ac:chgData name="Fatima Pillosu" userId="a6295d4dc9e22643" providerId="LiveId" clId="{0EC97EC2-C770-4AE8-9D0C-3702CDF83D14}" dt="2025-05-14T22:33:34.258" v="80"/>
+        <pc:spChg chg="add del mod">
+          <ac:chgData name="Fatima Pillosu" userId="a6295d4dc9e22643" providerId="LiveId" clId="{0EC97EC2-C770-4AE8-9D0C-3702CDF83D14}" dt="2025-05-25T20:52:53.842" v="81" actId="21"/>
           <ac:spMkLst>
             <pc:docMk/>
             <pc:sldMk cId="1380674543" sldId="256"/>
             <ac:spMk id="7" creationId="{47E1CCA9-1FE1-AC39-2A65-B2530877FE67}"/>
           </ac:spMkLst>
         </pc:spChg>
-        <pc:spChg chg="add mod">
-          <ac:chgData name="Fatima Pillosu" userId="a6295d4dc9e22643" providerId="LiveId" clId="{0EC97EC2-C770-4AE8-9D0C-3702CDF83D14}" dt="2025-05-14T22:33:34.258" v="80"/>
+        <pc:spChg chg="add del mod">
+          <ac:chgData name="Fatima Pillosu" userId="a6295d4dc9e22643" providerId="LiveId" clId="{0EC97EC2-C770-4AE8-9D0C-3702CDF83D14}" dt="2025-05-25T20:52:53.842" v="81" actId="21"/>
           <ac:spMkLst>
             <pc:docMk/>
             <pc:sldMk cId="1380674543" sldId="256"/>
             <ac:spMk id="8" creationId="{1BF944C8-72B7-EE1A-6F7B-CF42B3774EC5}"/>
           </ac:spMkLst>
         </pc:spChg>
-        <pc:spChg chg="add mod">
-          <ac:chgData name="Fatima Pillosu" userId="a6295d4dc9e22643" providerId="LiveId" clId="{0EC97EC2-C770-4AE8-9D0C-3702CDF83D14}" dt="2025-05-14T22:33:34.258" v="80"/>
+        <pc:spChg chg="add del mod">
+          <ac:chgData name="Fatima Pillosu" userId="a6295d4dc9e22643" providerId="LiveId" clId="{0EC97EC2-C770-4AE8-9D0C-3702CDF83D14}" dt="2025-05-25T20:52:53.842" v="81" actId="21"/>
           <ac:spMkLst>
             <pc:docMk/>
             <pc:sldMk cId="1380674543" sldId="256"/>
             <ac:spMk id="9" creationId="{E426F851-70D0-C74A-EE11-AF956E60CFE7}"/>
           </ac:spMkLst>
         </pc:spChg>
-        <pc:spChg chg="add mod">
-          <ac:chgData name="Fatima Pillosu" userId="a6295d4dc9e22643" providerId="LiveId" clId="{0EC97EC2-C770-4AE8-9D0C-3702CDF83D14}" dt="2025-05-14T22:33:34.258" v="80"/>
+        <pc:spChg chg="add del mod">
+          <ac:chgData name="Fatima Pillosu" userId="a6295d4dc9e22643" providerId="LiveId" clId="{0EC97EC2-C770-4AE8-9D0C-3702CDF83D14}" dt="2025-05-25T20:52:53.842" v="81" actId="21"/>
           <ac:spMkLst>
             <pc:docMk/>
             <pc:sldMk cId="1380674543" sldId="256"/>
             <ac:spMk id="10" creationId="{27EB65F3-73F5-B07A-A818-9796C53071D9}"/>
           </ac:spMkLst>
         </pc:spChg>
-        <pc:spChg chg="add mod">
-          <ac:chgData name="Fatima Pillosu" userId="a6295d4dc9e22643" providerId="LiveId" clId="{0EC97EC2-C770-4AE8-9D0C-3702CDF83D14}" dt="2025-05-14T22:33:34.258" v="80"/>
+        <pc:spChg chg="add del mod">
+          <ac:chgData name="Fatima Pillosu" userId="a6295d4dc9e22643" providerId="LiveId" clId="{0EC97EC2-C770-4AE8-9D0C-3702CDF83D14}" dt="2025-05-25T20:52:53.842" v="81" actId="21"/>
           <ac:spMkLst>
             <pc:docMk/>
             <pc:sldMk cId="1380674543" sldId="256"/>
             <ac:spMk id="11" creationId="{F8E8BF63-273E-0C12-2314-78FB9D7EA77C}"/>
           </ac:spMkLst>
         </pc:spChg>
-        <pc:spChg chg="add mod">
-          <ac:chgData name="Fatima Pillosu" userId="a6295d4dc9e22643" providerId="LiveId" clId="{0EC97EC2-C770-4AE8-9D0C-3702CDF83D14}" dt="2025-05-14T22:33:34.258" v="80"/>
+        <pc:spChg chg="add del mod">
+          <ac:chgData name="Fatima Pillosu" userId="a6295d4dc9e22643" providerId="LiveId" clId="{0EC97EC2-C770-4AE8-9D0C-3702CDF83D14}" dt="2025-05-25T20:52:53.842" v="81" actId="21"/>
           <ac:spMkLst>
             <pc:docMk/>
             <pc:sldMk cId="1380674543" sldId="256"/>
             <ac:spMk id="12" creationId="{31D547D6-3E3A-6367-A806-E3B56F1B5A30}"/>
           </ac:spMkLst>
         </pc:spChg>
-        <pc:spChg chg="add mod">
-          <ac:chgData name="Fatima Pillosu" userId="a6295d4dc9e22643" providerId="LiveId" clId="{0EC97EC2-C770-4AE8-9D0C-3702CDF83D14}" dt="2025-05-14T22:33:34.258" v="80"/>
+        <pc:spChg chg="add del mod">
+          <ac:chgData name="Fatima Pillosu" userId="a6295d4dc9e22643" providerId="LiveId" clId="{0EC97EC2-C770-4AE8-9D0C-3702CDF83D14}" dt="2025-05-25T20:52:53.842" v="81" actId="21"/>
           <ac:spMkLst>
             <pc:docMk/>
             <pc:sldMk cId="1380674543" sldId="256"/>
             <ac:spMk id="13" creationId="{8AF1D376-2A82-A44F-4F2C-5830FEE78451}"/>
           </ac:spMkLst>
         </pc:spChg>
-        <pc:spChg chg="add mod">
-          <ac:chgData name="Fatima Pillosu" userId="a6295d4dc9e22643" providerId="LiveId" clId="{0EC97EC2-C770-4AE8-9D0C-3702CDF83D14}" dt="2025-05-14T22:33:34.258" v="80"/>
+        <pc:spChg chg="add del mod">
+          <ac:chgData name="Fatima Pillosu" userId="a6295d4dc9e22643" providerId="LiveId" clId="{0EC97EC2-C770-4AE8-9D0C-3702CDF83D14}" dt="2025-05-25T20:52:53.842" v="81" actId="21"/>
           <ac:spMkLst>
             <pc:docMk/>
             <pc:sldMk cId="1380674543" sldId="256"/>
             <ac:spMk id="14" creationId="{28538DD9-DAB7-10B4-2328-9112FCBAC9B9}"/>
           </ac:spMkLst>
         </pc:spChg>
-        <pc:spChg chg="add mod">
-          <ac:chgData name="Fatima Pillosu" userId="a6295d4dc9e22643" providerId="LiveId" clId="{0EC97EC2-C770-4AE8-9D0C-3702CDF83D14}" dt="2025-05-14T22:33:34.258" v="80"/>
+        <pc:spChg chg="add del mod">
+          <ac:chgData name="Fatima Pillosu" userId="a6295d4dc9e22643" providerId="LiveId" clId="{0EC97EC2-C770-4AE8-9D0C-3702CDF83D14}" dt="2025-05-25T20:52:53.842" v="81" actId="21"/>
           <ac:spMkLst>
             <pc:docMk/>
             <pc:sldMk cId="1380674543" sldId="256"/>
             <ac:spMk id="15" creationId="{9F366357-E9B2-2CA5-1755-68B795391F73}"/>
           </ac:spMkLst>
         </pc:spChg>
-        <pc:spChg chg="add mod">
-          <ac:chgData name="Fatima Pillosu" userId="a6295d4dc9e22643" providerId="LiveId" clId="{0EC97EC2-C770-4AE8-9D0C-3702CDF83D14}" dt="2025-05-14T22:33:34.258" v="80"/>
+        <pc:spChg chg="add del mod">
+          <ac:chgData name="Fatima Pillosu" userId="a6295d4dc9e22643" providerId="LiveId" clId="{0EC97EC2-C770-4AE8-9D0C-3702CDF83D14}" dt="2025-05-25T20:52:53.842" v="81" actId="21"/>
           <ac:spMkLst>
             <pc:docMk/>
             <pc:sldMk cId="1380674543" sldId="256"/>
             <ac:spMk id="16" creationId="{344C4B38-03CB-55F0-EA16-6F4270C3443B}"/>
           </ac:spMkLst>
         </pc:spChg>
-        <pc:spChg chg="add mod">
-          <ac:chgData name="Fatima Pillosu" userId="a6295d4dc9e22643" providerId="LiveId" clId="{0EC97EC2-C770-4AE8-9D0C-3702CDF83D14}" dt="2025-05-14T22:33:34.258" v="80"/>
+        <pc:spChg chg="add del mod">
+          <ac:chgData name="Fatima Pillosu" userId="a6295d4dc9e22643" providerId="LiveId" clId="{0EC97EC2-C770-4AE8-9D0C-3702CDF83D14}" dt="2025-05-25T20:52:53.842" v="81" actId="21"/>
           <ac:spMkLst>
             <pc:docMk/>
             <pc:sldMk cId="1380674543" sldId="256"/>
             <ac:spMk id="17" creationId="{BAB5FA82-2A90-06EE-6258-9D203AB1BDB8}"/>
           </ac:spMkLst>
         </pc:spChg>
-        <pc:spChg chg="add mod">
-          <ac:chgData name="Fatima Pillosu" userId="a6295d4dc9e22643" providerId="LiveId" clId="{0EC97EC2-C770-4AE8-9D0C-3702CDF83D14}" dt="2025-05-14T22:33:34.258" v="80"/>
+        <pc:spChg chg="add del mod">
+          <ac:chgData name="Fatima Pillosu" userId="a6295d4dc9e22643" providerId="LiveId" clId="{0EC97EC2-C770-4AE8-9D0C-3702CDF83D14}" dt="2025-05-25T20:52:53.842" v="81" actId="21"/>
           <ac:spMkLst>
             <pc:docMk/>
             <pc:sldMk cId="1380674543" sldId="256"/>
             <ac:spMk id="19" creationId="{B6871B03-CD01-1DE9-106B-BECB69B252AC}"/>
           </ac:spMkLst>
         </pc:spChg>
-        <pc:spChg chg="add mod">
-          <ac:chgData name="Fatima Pillosu" userId="a6295d4dc9e22643" providerId="LiveId" clId="{0EC97EC2-C770-4AE8-9D0C-3702CDF83D14}" dt="2025-05-14T22:33:34.258" v="80"/>
+        <pc:spChg chg="add del mod">
+          <ac:chgData name="Fatima Pillosu" userId="a6295d4dc9e22643" providerId="LiveId" clId="{0EC97EC2-C770-4AE8-9D0C-3702CDF83D14}" dt="2025-05-25T20:52:53.842" v="81" actId="21"/>
           <ac:spMkLst>
             <pc:docMk/>
             <pc:sldMk cId="1380674543" sldId="256"/>
             <ac:spMk id="20" creationId="{ED01783E-4F4C-A8C9-3F22-8A910D6F8F90}"/>
           </ac:spMkLst>
         </pc:spChg>
-        <pc:spChg chg="add mod">
-          <ac:chgData name="Fatima Pillosu" userId="a6295d4dc9e22643" providerId="LiveId" clId="{0EC97EC2-C770-4AE8-9D0C-3702CDF83D14}" dt="2025-05-14T22:33:34.258" v="80"/>
+        <pc:spChg chg="add del mod">
+          <ac:chgData name="Fatima Pillosu" userId="a6295d4dc9e22643" providerId="LiveId" clId="{0EC97EC2-C770-4AE8-9D0C-3702CDF83D14}" dt="2025-05-25T20:52:53.842" v="81" actId="21"/>
           <ac:spMkLst>
             <pc:docMk/>
             <pc:sldMk cId="1380674543" sldId="256"/>
             <ac:spMk id="21" creationId="{6ECAE385-D2E4-A5F8-D03D-40BE92503682}"/>
           </ac:spMkLst>
         </pc:spChg>
-        <pc:spChg chg="add mod">
-          <ac:chgData name="Fatima Pillosu" userId="a6295d4dc9e22643" providerId="LiveId" clId="{0EC97EC2-C770-4AE8-9D0C-3702CDF83D14}" dt="2025-05-14T22:33:34.258" v="80"/>
+        <pc:spChg chg="add del mod">
+          <ac:chgData name="Fatima Pillosu" userId="a6295d4dc9e22643" providerId="LiveId" clId="{0EC97EC2-C770-4AE8-9D0C-3702CDF83D14}" dt="2025-05-25T20:52:53.842" v="81" actId="21"/>
           <ac:spMkLst>
             <pc:docMk/>
             <pc:sldMk cId="1380674543" sldId="256"/>
             <ac:spMk id="22" creationId="{377CE1CC-2AA5-9330-A970-BB92ACF08CEE}"/>
           </ac:spMkLst>
         </pc:spChg>
-        <pc:spChg chg="add mod">
-          <ac:chgData name="Fatima Pillosu" userId="a6295d4dc9e22643" providerId="LiveId" clId="{0EC97EC2-C770-4AE8-9D0C-3702CDF83D14}" dt="2025-05-14T22:33:34.258" v="80"/>
+        <pc:spChg chg="add del mod">
+          <ac:chgData name="Fatima Pillosu" userId="a6295d4dc9e22643" providerId="LiveId" clId="{0EC97EC2-C770-4AE8-9D0C-3702CDF83D14}" dt="2025-05-25T20:52:53.842" v="81" actId="21"/>
           <ac:spMkLst>
             <pc:docMk/>
             <pc:sldMk cId="1380674543" sldId="256"/>
             <ac:spMk id="23" creationId="{89D16ACE-F790-DC3D-1B03-3F9F7A9E10BB}"/>
           </ac:spMkLst>
         </pc:spChg>
-        <pc:spChg chg="add mod">
-          <ac:chgData name="Fatima Pillosu" userId="a6295d4dc9e22643" providerId="LiveId" clId="{0EC97EC2-C770-4AE8-9D0C-3702CDF83D14}" dt="2025-05-14T22:33:34.258" v="80"/>
+        <pc:spChg chg="add del mod">
+          <ac:chgData name="Fatima Pillosu" userId="a6295d4dc9e22643" providerId="LiveId" clId="{0EC97EC2-C770-4AE8-9D0C-3702CDF83D14}" dt="2025-05-25T20:52:53.842" v="81" actId="21"/>
           <ac:spMkLst>
             <pc:docMk/>
             <pc:sldMk cId="1380674543" sldId="256"/>
             <ac:spMk id="24" creationId="{BD98A7DA-E44F-537E-878D-920D528D2374}"/>
           </ac:spMkLst>
         </pc:spChg>
-        <pc:spChg chg="add mod">
-          <ac:chgData name="Fatima Pillosu" userId="a6295d4dc9e22643" providerId="LiveId" clId="{0EC97EC2-C770-4AE8-9D0C-3702CDF83D14}" dt="2025-05-14T22:33:34.258" v="80"/>
+        <pc:spChg chg="add del mod">
+          <ac:chgData name="Fatima Pillosu" userId="a6295d4dc9e22643" providerId="LiveId" clId="{0EC97EC2-C770-4AE8-9D0C-3702CDF83D14}" dt="2025-05-25T20:52:53.842" v="81" actId="21"/>
           <ac:spMkLst>
             <pc:docMk/>
             <pc:sldMk cId="1380674543" sldId="256"/>
             <ac:spMk id="25" creationId="{D91A9B1A-3935-E2D1-6A45-A04DB53FA9AF}"/>
           </ac:spMkLst>
         </pc:spChg>
-        <pc:spChg chg="add mod">
-          <ac:chgData name="Fatima Pillosu" userId="a6295d4dc9e22643" providerId="LiveId" clId="{0EC97EC2-C770-4AE8-9D0C-3702CDF83D14}" dt="2025-05-14T22:33:34.258" v="80"/>
+        <pc:spChg chg="add del mod">
+          <ac:chgData name="Fatima Pillosu" userId="a6295d4dc9e22643" providerId="LiveId" clId="{0EC97EC2-C770-4AE8-9D0C-3702CDF83D14}" dt="2025-05-25T20:52:53.842" v="81" actId="21"/>
           <ac:spMkLst>
             <pc:docMk/>
             <pc:sldMk cId="1380674543" sldId="256"/>
             <ac:spMk id="26" creationId="{FD0F6C0C-3187-59C2-B8AB-8CE80E69B405}"/>
           </ac:spMkLst>
         </pc:spChg>
-        <pc:spChg chg="add mod">
-          <ac:chgData name="Fatima Pillosu" userId="a6295d4dc9e22643" providerId="LiveId" clId="{0EC97EC2-C770-4AE8-9D0C-3702CDF83D14}" dt="2025-05-14T22:33:34.258" v="80"/>
+        <pc:spChg chg="add del mod">
+          <ac:chgData name="Fatima Pillosu" userId="a6295d4dc9e22643" providerId="LiveId" clId="{0EC97EC2-C770-4AE8-9D0C-3702CDF83D14}" dt="2025-05-25T20:52:53.842" v="81" actId="21"/>
           <ac:spMkLst>
             <pc:docMk/>
             <pc:sldMk cId="1380674543" sldId="256"/>
             <ac:spMk id="27" creationId="{B9263D22-8B6B-1445-8A0C-5061E90D79EF}"/>
           </ac:spMkLst>
         </pc:spChg>
-        <pc:spChg chg="add mod">
-          <ac:chgData name="Fatima Pillosu" userId="a6295d4dc9e22643" providerId="LiveId" clId="{0EC97EC2-C770-4AE8-9D0C-3702CDF83D14}" dt="2025-05-14T22:33:34.258" v="80"/>
+        <pc:spChg chg="add del mod">
+          <ac:chgData name="Fatima Pillosu" userId="a6295d4dc9e22643" providerId="LiveId" clId="{0EC97EC2-C770-4AE8-9D0C-3702CDF83D14}" dt="2025-05-25T20:52:53.842" v="81" actId="21"/>
           <ac:spMkLst>
             <pc:docMk/>
             <pc:sldMk cId="1380674543" sldId="256"/>
             <ac:spMk id="28" creationId="{734D8A0F-DA4D-8309-F970-E2530B211CA4}"/>
           </ac:spMkLst>
         </pc:spChg>
-        <pc:spChg chg="add mod">
-          <ac:chgData name="Fatima Pillosu" userId="a6295d4dc9e22643" providerId="LiveId" clId="{0EC97EC2-C770-4AE8-9D0C-3702CDF83D14}" dt="2025-05-14T22:33:34.258" v="80"/>
+        <pc:spChg chg="add del mod">
+          <ac:chgData name="Fatima Pillosu" userId="a6295d4dc9e22643" providerId="LiveId" clId="{0EC97EC2-C770-4AE8-9D0C-3702CDF83D14}" dt="2025-05-25T20:52:53.842" v="81" actId="21"/>
           <ac:spMkLst>
             <pc:docMk/>
             <pc:sldMk cId="1380674543" sldId="256"/>
             <ac:spMk id="29" creationId="{D6D9CBDE-E9C7-3D16-96D4-8E67B270EAE3}"/>
           </ac:spMkLst>
         </pc:spChg>
-        <pc:spChg chg="add mod">
-          <ac:chgData name="Fatima Pillosu" userId="a6295d4dc9e22643" providerId="LiveId" clId="{0EC97EC2-C770-4AE8-9D0C-3702CDF83D14}" dt="2025-05-14T22:33:34.258" v="80"/>
+        <pc:spChg chg="add del mod">
+          <ac:chgData name="Fatima Pillosu" userId="a6295d4dc9e22643" providerId="LiveId" clId="{0EC97EC2-C770-4AE8-9D0C-3702CDF83D14}" dt="2025-05-25T20:52:53.842" v="81" actId="21"/>
           <ac:spMkLst>
             <pc:docMk/>
             <pc:sldMk cId="1380674543" sldId="256"/>
             <ac:spMk id="30" creationId="{A7B8CD3B-CE6E-F022-E60D-BF8E98B05737}"/>
           </ac:spMkLst>
         </pc:spChg>
-        <pc:spChg chg="add mod">
-          <ac:chgData name="Fatima Pillosu" userId="a6295d4dc9e22643" providerId="LiveId" clId="{0EC97EC2-C770-4AE8-9D0C-3702CDF83D14}" dt="2025-05-14T22:33:34.258" v="80"/>
+        <pc:spChg chg="add del mod">
+          <ac:chgData name="Fatima Pillosu" userId="a6295d4dc9e22643" providerId="LiveId" clId="{0EC97EC2-C770-4AE8-9D0C-3702CDF83D14}" dt="2025-05-25T20:52:53.842" v="81" actId="21"/>
           <ac:spMkLst>
             <pc:docMk/>
             <pc:sldMk cId="1380674543" sldId="256"/>
             <ac:spMk id="31" creationId="{3BA2A2CA-0B12-CD6C-AFDA-1197C74E9C14}"/>
           </ac:spMkLst>
         </pc:spChg>
-        <pc:spChg chg="add mod">
-          <ac:chgData name="Fatima Pillosu" userId="a6295d4dc9e22643" providerId="LiveId" clId="{0EC97EC2-C770-4AE8-9D0C-3702CDF83D14}" dt="2025-05-14T22:33:34.258" v="80"/>
+        <pc:spChg chg="add del mod">
+          <ac:chgData name="Fatima Pillosu" userId="a6295d4dc9e22643" providerId="LiveId" clId="{0EC97EC2-C770-4AE8-9D0C-3702CDF83D14}" dt="2025-05-25T20:52:53.842" v="81" actId="21"/>
           <ac:spMkLst>
             <pc:docMk/>
             <pc:sldMk cId="1380674543" sldId="256"/>
             <ac:spMk id="32" creationId="{457BE35D-A1A5-58C6-2F5E-A07F0ABA918B}"/>
           </ac:spMkLst>
         </pc:spChg>
-        <pc:spChg chg="add mod">
-          <ac:chgData name="Fatima Pillosu" userId="a6295d4dc9e22643" providerId="LiveId" clId="{0EC97EC2-C770-4AE8-9D0C-3702CDF83D14}" dt="2025-05-14T22:33:34.258" v="80"/>
+        <pc:spChg chg="add del mod">
+          <ac:chgData name="Fatima Pillosu" userId="a6295d4dc9e22643" providerId="LiveId" clId="{0EC97EC2-C770-4AE8-9D0C-3702CDF83D14}" dt="2025-05-25T20:52:53.842" v="81" actId="21"/>
           <ac:spMkLst>
             <pc:docMk/>
             <pc:sldMk cId="1380674543" sldId="256"/>
             <ac:spMk id="33" creationId="{3E807561-1BE6-323C-01CD-ACB63198B423}"/>
           </ac:spMkLst>
         </pc:spChg>
-        <pc:spChg chg="add mod">
-          <ac:chgData name="Fatima Pillosu" userId="a6295d4dc9e22643" providerId="LiveId" clId="{0EC97EC2-C770-4AE8-9D0C-3702CDF83D14}" dt="2025-05-14T22:33:34.258" v="80"/>
+        <pc:spChg chg="add del mod">
+          <ac:chgData name="Fatima Pillosu" userId="a6295d4dc9e22643" providerId="LiveId" clId="{0EC97EC2-C770-4AE8-9D0C-3702CDF83D14}" dt="2025-05-25T20:52:53.842" v="81" actId="21"/>
           <ac:spMkLst>
             <pc:docMk/>
             <pc:sldMk cId="1380674543" sldId="256"/>
             <ac:spMk id="34" creationId="{36CCD4FD-C539-D5EE-73D0-29235DA41DB6}"/>
           </ac:spMkLst>
         </pc:spChg>
-        <pc:spChg chg="add mod">
-          <ac:chgData name="Fatima Pillosu" userId="a6295d4dc9e22643" providerId="LiveId" clId="{0EC97EC2-C770-4AE8-9D0C-3702CDF83D14}" dt="2025-05-14T22:33:34.258" v="80"/>
+        <pc:spChg chg="add del mod">
+          <ac:chgData name="Fatima Pillosu" userId="a6295d4dc9e22643" providerId="LiveId" clId="{0EC97EC2-C770-4AE8-9D0C-3702CDF83D14}" dt="2025-05-25T20:52:53.842" v="81" actId="21"/>
           <ac:spMkLst>
             <pc:docMk/>
             <pc:sldMk cId="1380674543" sldId="256"/>
             <ac:spMk id="35" creationId="{E464C751-1730-9A7E-ECC2-2153B2204BBA}"/>
           </ac:spMkLst>
         </pc:spChg>
-        <pc:spChg chg="add mod">
-          <ac:chgData name="Fatima Pillosu" userId="a6295d4dc9e22643" providerId="LiveId" clId="{0EC97EC2-C770-4AE8-9D0C-3702CDF83D14}" dt="2025-05-14T22:33:34.258" v="80"/>
+        <pc:spChg chg="add del mod">
+          <ac:chgData name="Fatima Pillosu" userId="a6295d4dc9e22643" providerId="LiveId" clId="{0EC97EC2-C770-4AE8-9D0C-3702CDF83D14}" dt="2025-05-25T20:52:53.842" v="81" actId="21"/>
           <ac:spMkLst>
             <pc:docMk/>
             <pc:sldMk cId="1380674543" sldId="256"/>
             <ac:spMk id="36" creationId="{99BDB8A4-0494-689D-2507-94CDCEB8D0C2}"/>
           </ac:spMkLst>
         </pc:spChg>
-        <pc:spChg chg="add mod">
-          <ac:chgData name="Fatima Pillosu" userId="a6295d4dc9e22643" providerId="LiveId" clId="{0EC97EC2-C770-4AE8-9D0C-3702CDF83D14}" dt="2025-05-14T22:33:34.258" v="80"/>
+        <pc:spChg chg="add del mod">
+          <ac:chgData name="Fatima Pillosu" userId="a6295d4dc9e22643" providerId="LiveId" clId="{0EC97EC2-C770-4AE8-9D0C-3702CDF83D14}" dt="2025-05-25T20:52:53.842" v="81" actId="21"/>
           <ac:spMkLst>
             <pc:docMk/>
             <pc:sldMk cId="1380674543" sldId="256"/>
             <ac:spMk id="37" creationId="{22C4AD5E-E154-1EAD-C284-141D4E15EB00}"/>
           </ac:spMkLst>
         </pc:spChg>
-        <pc:spChg chg="add mod">
-          <ac:chgData name="Fatima Pillosu" userId="a6295d4dc9e22643" providerId="LiveId" clId="{0EC97EC2-C770-4AE8-9D0C-3702CDF83D14}" dt="2025-05-14T22:33:34.258" v="80"/>
+        <pc:spChg chg="add del mod">
+          <ac:chgData name="Fatima Pillosu" userId="a6295d4dc9e22643" providerId="LiveId" clId="{0EC97EC2-C770-4AE8-9D0C-3702CDF83D14}" dt="2025-05-25T20:52:53.842" v="81" actId="21"/>
           <ac:spMkLst>
             <pc:docMk/>
             <pc:sldMk cId="1380674543" sldId="256"/>
             <ac:spMk id="38" creationId="{64644FAA-9682-8175-4D83-E0FAEBF5AECF}"/>
           </ac:spMkLst>
         </pc:spChg>
-        <pc:spChg chg="add mod">
-          <ac:chgData name="Fatima Pillosu" userId="a6295d4dc9e22643" providerId="LiveId" clId="{0EC97EC2-C770-4AE8-9D0C-3702CDF83D14}" dt="2025-05-14T22:33:34.258" v="80"/>
+        <pc:spChg chg="add del mod">
+          <ac:chgData name="Fatima Pillosu" userId="a6295d4dc9e22643" providerId="LiveId" clId="{0EC97EC2-C770-4AE8-9D0C-3702CDF83D14}" dt="2025-05-25T20:52:53.842" v="81" actId="21"/>
           <ac:spMkLst>
             <pc:docMk/>
             <pc:sldMk cId="1380674543" sldId="256"/>
             <ac:spMk id="39" creationId="{F606AFF2-A448-29EC-8740-4E64AAE7AB72}"/>
           </ac:spMkLst>
         </pc:spChg>
-        <pc:spChg chg="add mod">
-          <ac:chgData name="Fatima Pillosu" userId="a6295d4dc9e22643" providerId="LiveId" clId="{0EC97EC2-C770-4AE8-9D0C-3702CDF83D14}" dt="2025-05-14T22:33:34.258" v="80"/>
+        <pc:spChg chg="add del mod">
+          <ac:chgData name="Fatima Pillosu" userId="a6295d4dc9e22643" providerId="LiveId" clId="{0EC97EC2-C770-4AE8-9D0C-3702CDF83D14}" dt="2025-05-25T20:52:53.842" v="81" actId="21"/>
           <ac:spMkLst>
             <pc:docMk/>
             <pc:sldMk cId="1380674543" sldId="256"/>
             <ac:spMk id="40" creationId="{47CED736-C2A1-36CE-3DF2-F463782B7FF3}"/>
           </ac:spMkLst>
         </pc:spChg>
-        <pc:spChg chg="add mod">
-          <ac:chgData name="Fatima Pillosu" userId="a6295d4dc9e22643" providerId="LiveId" clId="{0EC97EC2-C770-4AE8-9D0C-3702CDF83D14}" dt="2025-05-14T22:33:34.258" v="80"/>
+        <pc:spChg chg="add del mod">
+          <ac:chgData name="Fatima Pillosu" userId="a6295d4dc9e22643" providerId="LiveId" clId="{0EC97EC2-C770-4AE8-9D0C-3702CDF83D14}" dt="2025-05-25T20:52:53.842" v="81" actId="21"/>
           <ac:spMkLst>
             <pc:docMk/>
             <pc:sldMk cId="1380674543" sldId="256"/>
             <ac:spMk id="41" creationId="{59215346-0A39-CC39-D2D8-603954054EC6}"/>
           </ac:spMkLst>
         </pc:spChg>
-        <pc:spChg chg="add mod">
-          <ac:chgData name="Fatima Pillosu" userId="a6295d4dc9e22643" providerId="LiveId" clId="{0EC97EC2-C770-4AE8-9D0C-3702CDF83D14}" dt="2025-05-14T22:33:34.258" v="80"/>
+        <pc:spChg chg="add del mod">
+          <ac:chgData name="Fatima Pillosu" userId="a6295d4dc9e22643" providerId="LiveId" clId="{0EC97EC2-C770-4AE8-9D0C-3702CDF83D14}" dt="2025-05-25T20:52:53.842" v="81" actId="21"/>
           <ac:spMkLst>
             <pc:docMk/>
             <pc:sldMk cId="1380674543" sldId="256"/>
             <ac:spMk id="42" creationId="{C7F77EE4-03F2-CE29-7AAC-D2E58CAD0D6F}"/>
           </ac:spMkLst>
         </pc:spChg>
-        <pc:spChg chg="add mod">
-          <ac:chgData name="Fatima Pillosu" userId="a6295d4dc9e22643" providerId="LiveId" clId="{0EC97EC2-C770-4AE8-9D0C-3702CDF83D14}" dt="2025-05-14T22:33:34.258" v="80"/>
+        <pc:spChg chg="add del mod">
+          <ac:chgData name="Fatima Pillosu" userId="a6295d4dc9e22643" providerId="LiveId" clId="{0EC97EC2-C770-4AE8-9D0C-3702CDF83D14}" dt="2025-05-25T20:52:53.842" v="81" actId="21"/>
           <ac:spMkLst>
             <pc:docMk/>
             <pc:sldMk cId="1380674543" sldId="256"/>
             <ac:spMk id="43" creationId="{858257CA-1ABF-6E30-7CB5-A356C4E21C51}"/>
           </ac:spMkLst>
         </pc:spChg>
-        <pc:spChg chg="add mod">
-          <ac:chgData name="Fatima Pillosu" userId="a6295d4dc9e22643" providerId="LiveId" clId="{0EC97EC2-C770-4AE8-9D0C-3702CDF83D14}" dt="2025-05-14T22:33:34.258" v="80"/>
+        <pc:spChg chg="add del mod">
+          <ac:chgData name="Fatima Pillosu" userId="a6295d4dc9e22643" providerId="LiveId" clId="{0EC97EC2-C770-4AE8-9D0C-3702CDF83D14}" dt="2025-05-25T20:52:53.842" v="81" actId="21"/>
           <ac:spMkLst>
             <pc:docMk/>
             <pc:sldMk cId="1380674543" sldId="256"/>
             <ac:spMk id="44" creationId="{C9DC7499-5DE0-F436-0A8B-A070DEA8096C}"/>
           </ac:spMkLst>
         </pc:spChg>
-        <pc:spChg chg="add mod">
-          <ac:chgData name="Fatima Pillosu" userId="a6295d4dc9e22643" providerId="LiveId" clId="{0EC97EC2-C770-4AE8-9D0C-3702CDF83D14}" dt="2025-05-14T22:33:34.258" v="80"/>
+        <pc:spChg chg="add del mod">
+          <ac:chgData name="Fatima Pillosu" userId="a6295d4dc9e22643" providerId="LiveId" clId="{0EC97EC2-C770-4AE8-9D0C-3702CDF83D14}" dt="2025-05-25T20:52:53.842" v="81" actId="21"/>
           <ac:spMkLst>
             <pc:docMk/>
             <pc:sldMk cId="1380674543" sldId="256"/>
             <ac:spMk id="45" creationId="{ECD1FCB4-C01C-4739-8CFD-EEF0675DC2CE}"/>
+          </ac:spMkLst>
+        </pc:spChg>
+        <pc:spChg chg="add del mod">
+          <ac:chgData name="Fatima Pillosu" userId="a6295d4dc9e22643" providerId="LiveId" clId="{0EC97EC2-C770-4AE8-9D0C-3702CDF83D14}" dt="2025-05-25T20:56:11.319" v="89" actId="21"/>
+          <ac:spMkLst>
+            <pc:docMk/>
+            <pc:sldMk cId="1380674543" sldId="256"/>
+            <ac:spMk id="47" creationId="{0C7866F8-3D28-D23F-94F4-31434FC45C8D}"/>
+          </ac:spMkLst>
+        </pc:spChg>
+        <pc:spChg chg="add del mod">
+          <ac:chgData name="Fatima Pillosu" userId="a6295d4dc9e22643" providerId="LiveId" clId="{0EC97EC2-C770-4AE8-9D0C-3702CDF83D14}" dt="2025-05-25T20:56:11.319" v="89" actId="21"/>
+          <ac:spMkLst>
+            <pc:docMk/>
+            <pc:sldMk cId="1380674543" sldId="256"/>
+            <ac:spMk id="48" creationId="{12F23E37-D850-2205-D764-E65B9EEE2D3F}"/>
+          </ac:spMkLst>
+        </pc:spChg>
+        <pc:spChg chg="add del mod">
+          <ac:chgData name="Fatima Pillosu" userId="a6295d4dc9e22643" providerId="LiveId" clId="{0EC97EC2-C770-4AE8-9D0C-3702CDF83D14}" dt="2025-05-25T20:56:11.319" v="89" actId="21"/>
+          <ac:spMkLst>
+            <pc:docMk/>
+            <pc:sldMk cId="1380674543" sldId="256"/>
+            <ac:spMk id="49" creationId="{47E1CCA9-1FE1-AC39-2A65-B2530877FE67}"/>
+          </ac:spMkLst>
+        </pc:spChg>
+        <pc:spChg chg="add del mod">
+          <ac:chgData name="Fatima Pillosu" userId="a6295d4dc9e22643" providerId="LiveId" clId="{0EC97EC2-C770-4AE8-9D0C-3702CDF83D14}" dt="2025-05-25T20:56:11.319" v="89" actId="21"/>
+          <ac:spMkLst>
+            <pc:docMk/>
+            <pc:sldMk cId="1380674543" sldId="256"/>
+            <ac:spMk id="50" creationId="{1BF944C8-72B7-EE1A-6F7B-CF42B3774EC5}"/>
+          </ac:spMkLst>
+        </pc:spChg>
+        <pc:spChg chg="add del mod">
+          <ac:chgData name="Fatima Pillosu" userId="a6295d4dc9e22643" providerId="LiveId" clId="{0EC97EC2-C770-4AE8-9D0C-3702CDF83D14}" dt="2025-05-25T20:56:11.319" v="89" actId="21"/>
+          <ac:spMkLst>
+            <pc:docMk/>
+            <pc:sldMk cId="1380674543" sldId="256"/>
+            <ac:spMk id="51" creationId="{E426F851-70D0-C74A-EE11-AF956E60CFE7}"/>
+          </ac:spMkLst>
+        </pc:spChg>
+        <pc:spChg chg="add del mod">
+          <ac:chgData name="Fatima Pillosu" userId="a6295d4dc9e22643" providerId="LiveId" clId="{0EC97EC2-C770-4AE8-9D0C-3702CDF83D14}" dt="2025-05-25T20:56:11.319" v="89" actId="21"/>
+          <ac:spMkLst>
+            <pc:docMk/>
+            <pc:sldMk cId="1380674543" sldId="256"/>
+            <ac:spMk id="52" creationId="{27EB65F3-73F5-B07A-A818-9796C53071D9}"/>
+          </ac:spMkLst>
+        </pc:spChg>
+        <pc:spChg chg="add del mod">
+          <ac:chgData name="Fatima Pillosu" userId="a6295d4dc9e22643" providerId="LiveId" clId="{0EC97EC2-C770-4AE8-9D0C-3702CDF83D14}" dt="2025-05-25T20:56:11.319" v="89" actId="21"/>
+          <ac:spMkLst>
+            <pc:docMk/>
+            <pc:sldMk cId="1380674543" sldId="256"/>
+            <ac:spMk id="53" creationId="{F8E8BF63-273E-0C12-2314-78FB9D7EA77C}"/>
+          </ac:spMkLst>
+        </pc:spChg>
+        <pc:spChg chg="add del mod">
+          <ac:chgData name="Fatima Pillosu" userId="a6295d4dc9e22643" providerId="LiveId" clId="{0EC97EC2-C770-4AE8-9D0C-3702CDF83D14}" dt="2025-05-25T20:56:11.319" v="89" actId="21"/>
+          <ac:spMkLst>
+            <pc:docMk/>
+            <pc:sldMk cId="1380674543" sldId="256"/>
+            <ac:spMk id="54" creationId="{31D547D6-3E3A-6367-A806-E3B56F1B5A30}"/>
+          </ac:spMkLst>
+        </pc:spChg>
+        <pc:spChg chg="add del mod">
+          <ac:chgData name="Fatima Pillosu" userId="a6295d4dc9e22643" providerId="LiveId" clId="{0EC97EC2-C770-4AE8-9D0C-3702CDF83D14}" dt="2025-05-25T20:56:11.319" v="89" actId="21"/>
+          <ac:spMkLst>
+            <pc:docMk/>
+            <pc:sldMk cId="1380674543" sldId="256"/>
+            <ac:spMk id="55" creationId="{8AF1D376-2A82-A44F-4F2C-5830FEE78451}"/>
+          </ac:spMkLst>
+        </pc:spChg>
+        <pc:spChg chg="add del mod">
+          <ac:chgData name="Fatima Pillosu" userId="a6295d4dc9e22643" providerId="LiveId" clId="{0EC97EC2-C770-4AE8-9D0C-3702CDF83D14}" dt="2025-05-25T20:56:11.319" v="89" actId="21"/>
+          <ac:spMkLst>
+            <pc:docMk/>
+            <pc:sldMk cId="1380674543" sldId="256"/>
+            <ac:spMk id="56" creationId="{28538DD9-DAB7-10B4-2328-9112FCBAC9B9}"/>
+          </ac:spMkLst>
+        </pc:spChg>
+        <pc:spChg chg="add del mod">
+          <ac:chgData name="Fatima Pillosu" userId="a6295d4dc9e22643" providerId="LiveId" clId="{0EC97EC2-C770-4AE8-9D0C-3702CDF83D14}" dt="2025-05-25T20:56:11.319" v="89" actId="21"/>
+          <ac:spMkLst>
+            <pc:docMk/>
+            <pc:sldMk cId="1380674543" sldId="256"/>
+            <ac:spMk id="57" creationId="{9F366357-E9B2-2CA5-1755-68B795391F73}"/>
+          </ac:spMkLst>
+        </pc:spChg>
+        <pc:spChg chg="add del mod">
+          <ac:chgData name="Fatima Pillosu" userId="a6295d4dc9e22643" providerId="LiveId" clId="{0EC97EC2-C770-4AE8-9D0C-3702CDF83D14}" dt="2025-05-25T20:56:11.319" v="89" actId="21"/>
+          <ac:spMkLst>
+            <pc:docMk/>
+            <pc:sldMk cId="1380674543" sldId="256"/>
+            <ac:spMk id="58" creationId="{344C4B38-03CB-55F0-EA16-6F4270C3443B}"/>
+          </ac:spMkLst>
+        </pc:spChg>
+        <pc:spChg chg="add del mod">
+          <ac:chgData name="Fatima Pillosu" userId="a6295d4dc9e22643" providerId="LiveId" clId="{0EC97EC2-C770-4AE8-9D0C-3702CDF83D14}" dt="2025-05-25T20:56:11.319" v="89" actId="21"/>
+          <ac:spMkLst>
+            <pc:docMk/>
+            <pc:sldMk cId="1380674543" sldId="256"/>
+            <ac:spMk id="59" creationId="{BAB5FA82-2A90-06EE-6258-9D203AB1BDB8}"/>
+          </ac:spMkLst>
+        </pc:spChg>
+        <pc:spChg chg="add del mod">
+          <ac:chgData name="Fatima Pillosu" userId="a6295d4dc9e22643" providerId="LiveId" clId="{0EC97EC2-C770-4AE8-9D0C-3702CDF83D14}" dt="2025-05-25T20:56:11.319" v="89" actId="21"/>
+          <ac:spMkLst>
+            <pc:docMk/>
+            <pc:sldMk cId="1380674543" sldId="256"/>
+            <ac:spMk id="61" creationId="{B6871B03-CD01-1DE9-106B-BECB69B252AC}"/>
+          </ac:spMkLst>
+        </pc:spChg>
+        <pc:spChg chg="add del mod">
+          <ac:chgData name="Fatima Pillosu" userId="a6295d4dc9e22643" providerId="LiveId" clId="{0EC97EC2-C770-4AE8-9D0C-3702CDF83D14}" dt="2025-05-25T20:56:11.319" v="89" actId="21"/>
+          <ac:spMkLst>
+            <pc:docMk/>
+            <pc:sldMk cId="1380674543" sldId="256"/>
+            <ac:spMk id="62" creationId="{ED01783E-4F4C-A8C9-3F22-8A910D6F8F90}"/>
+          </ac:spMkLst>
+        </pc:spChg>
+        <pc:spChg chg="add del mod">
+          <ac:chgData name="Fatima Pillosu" userId="a6295d4dc9e22643" providerId="LiveId" clId="{0EC97EC2-C770-4AE8-9D0C-3702CDF83D14}" dt="2025-05-25T20:56:11.319" v="89" actId="21"/>
+          <ac:spMkLst>
+            <pc:docMk/>
+            <pc:sldMk cId="1380674543" sldId="256"/>
+            <ac:spMk id="63" creationId="{6ECAE385-D2E4-A5F8-D03D-40BE92503682}"/>
+          </ac:spMkLst>
+        </pc:spChg>
+        <pc:spChg chg="add del mod">
+          <ac:chgData name="Fatima Pillosu" userId="a6295d4dc9e22643" providerId="LiveId" clId="{0EC97EC2-C770-4AE8-9D0C-3702CDF83D14}" dt="2025-05-25T20:56:11.319" v="89" actId="21"/>
+          <ac:spMkLst>
+            <pc:docMk/>
+            <pc:sldMk cId="1380674543" sldId="256"/>
+            <ac:spMk id="64" creationId="{377CE1CC-2AA5-9330-A970-BB92ACF08CEE}"/>
+          </ac:spMkLst>
+        </pc:spChg>
+        <pc:spChg chg="add del mod">
+          <ac:chgData name="Fatima Pillosu" userId="a6295d4dc9e22643" providerId="LiveId" clId="{0EC97EC2-C770-4AE8-9D0C-3702CDF83D14}" dt="2025-05-25T20:56:11.319" v="89" actId="21"/>
+          <ac:spMkLst>
+            <pc:docMk/>
+            <pc:sldMk cId="1380674543" sldId="256"/>
+            <ac:spMk id="65" creationId="{89D16ACE-F790-DC3D-1B03-3F9F7A9E10BB}"/>
+          </ac:spMkLst>
+        </pc:spChg>
+        <pc:spChg chg="add del mod">
+          <ac:chgData name="Fatima Pillosu" userId="a6295d4dc9e22643" providerId="LiveId" clId="{0EC97EC2-C770-4AE8-9D0C-3702CDF83D14}" dt="2025-05-25T20:56:11.319" v="89" actId="21"/>
+          <ac:spMkLst>
+            <pc:docMk/>
+            <pc:sldMk cId="1380674543" sldId="256"/>
+            <ac:spMk id="66" creationId="{BD98A7DA-E44F-537E-878D-920D528D2374}"/>
+          </ac:spMkLst>
+        </pc:spChg>
+        <pc:spChg chg="add del mod">
+          <ac:chgData name="Fatima Pillosu" userId="a6295d4dc9e22643" providerId="LiveId" clId="{0EC97EC2-C770-4AE8-9D0C-3702CDF83D14}" dt="2025-05-25T20:56:11.319" v="89" actId="21"/>
+          <ac:spMkLst>
+            <pc:docMk/>
+            <pc:sldMk cId="1380674543" sldId="256"/>
+            <ac:spMk id="67" creationId="{D91A9B1A-3935-E2D1-6A45-A04DB53FA9AF}"/>
+          </ac:spMkLst>
+        </pc:spChg>
+        <pc:spChg chg="add del mod">
+          <ac:chgData name="Fatima Pillosu" userId="a6295d4dc9e22643" providerId="LiveId" clId="{0EC97EC2-C770-4AE8-9D0C-3702CDF83D14}" dt="2025-05-25T20:56:11.319" v="89" actId="21"/>
+          <ac:spMkLst>
+            <pc:docMk/>
+            <pc:sldMk cId="1380674543" sldId="256"/>
+            <ac:spMk id="68" creationId="{FD0F6C0C-3187-59C2-B8AB-8CE80E69B405}"/>
+          </ac:spMkLst>
+        </pc:spChg>
+        <pc:spChg chg="add del mod">
+          <ac:chgData name="Fatima Pillosu" userId="a6295d4dc9e22643" providerId="LiveId" clId="{0EC97EC2-C770-4AE8-9D0C-3702CDF83D14}" dt="2025-05-25T20:56:11.319" v="89" actId="21"/>
+          <ac:spMkLst>
+            <pc:docMk/>
+            <pc:sldMk cId="1380674543" sldId="256"/>
+            <ac:spMk id="69" creationId="{B9263D22-8B6B-1445-8A0C-5061E90D79EF}"/>
+          </ac:spMkLst>
+        </pc:spChg>
+        <pc:spChg chg="add del mod">
+          <ac:chgData name="Fatima Pillosu" userId="a6295d4dc9e22643" providerId="LiveId" clId="{0EC97EC2-C770-4AE8-9D0C-3702CDF83D14}" dt="2025-05-25T20:56:11.319" v="89" actId="21"/>
+          <ac:spMkLst>
+            <pc:docMk/>
+            <pc:sldMk cId="1380674543" sldId="256"/>
+            <ac:spMk id="70" creationId="{734D8A0F-DA4D-8309-F970-E2530B211CA4}"/>
+          </ac:spMkLst>
+        </pc:spChg>
+        <pc:spChg chg="add del mod">
+          <ac:chgData name="Fatima Pillosu" userId="a6295d4dc9e22643" providerId="LiveId" clId="{0EC97EC2-C770-4AE8-9D0C-3702CDF83D14}" dt="2025-05-25T20:56:11.319" v="89" actId="21"/>
+          <ac:spMkLst>
+            <pc:docMk/>
+            <pc:sldMk cId="1380674543" sldId="256"/>
+            <ac:spMk id="71" creationId="{D6D9CBDE-E9C7-3D16-96D4-8E67B270EAE3}"/>
+          </ac:spMkLst>
+        </pc:spChg>
+        <pc:spChg chg="add del mod">
+          <ac:chgData name="Fatima Pillosu" userId="a6295d4dc9e22643" providerId="LiveId" clId="{0EC97EC2-C770-4AE8-9D0C-3702CDF83D14}" dt="2025-05-25T20:56:11.319" v="89" actId="21"/>
+          <ac:spMkLst>
+            <pc:docMk/>
+            <pc:sldMk cId="1380674543" sldId="256"/>
+            <ac:spMk id="72" creationId="{A7B8CD3B-CE6E-F022-E60D-BF8E98B05737}"/>
+          </ac:spMkLst>
+        </pc:spChg>
+        <pc:spChg chg="add del mod">
+          <ac:chgData name="Fatima Pillosu" userId="a6295d4dc9e22643" providerId="LiveId" clId="{0EC97EC2-C770-4AE8-9D0C-3702CDF83D14}" dt="2025-05-25T20:56:11.319" v="89" actId="21"/>
+          <ac:spMkLst>
+            <pc:docMk/>
+            <pc:sldMk cId="1380674543" sldId="256"/>
+            <ac:spMk id="73" creationId="{3BA2A2CA-0B12-CD6C-AFDA-1197C74E9C14}"/>
+          </ac:spMkLst>
+        </pc:spChg>
+        <pc:spChg chg="add del mod">
+          <ac:chgData name="Fatima Pillosu" userId="a6295d4dc9e22643" providerId="LiveId" clId="{0EC97EC2-C770-4AE8-9D0C-3702CDF83D14}" dt="2025-05-25T20:56:11.319" v="89" actId="21"/>
+          <ac:spMkLst>
+            <pc:docMk/>
+            <pc:sldMk cId="1380674543" sldId="256"/>
+            <ac:spMk id="74" creationId="{457BE35D-A1A5-58C6-2F5E-A07F0ABA918B}"/>
+          </ac:spMkLst>
+        </pc:spChg>
+        <pc:spChg chg="add del mod">
+          <ac:chgData name="Fatima Pillosu" userId="a6295d4dc9e22643" providerId="LiveId" clId="{0EC97EC2-C770-4AE8-9D0C-3702CDF83D14}" dt="2025-05-25T20:56:11.319" v="89" actId="21"/>
+          <ac:spMkLst>
+            <pc:docMk/>
+            <pc:sldMk cId="1380674543" sldId="256"/>
+            <ac:spMk id="75" creationId="{3E807561-1BE6-323C-01CD-ACB63198B423}"/>
+          </ac:spMkLst>
+        </pc:spChg>
+        <pc:spChg chg="add del mod">
+          <ac:chgData name="Fatima Pillosu" userId="a6295d4dc9e22643" providerId="LiveId" clId="{0EC97EC2-C770-4AE8-9D0C-3702CDF83D14}" dt="2025-05-25T20:56:11.319" v="89" actId="21"/>
+          <ac:spMkLst>
+            <pc:docMk/>
+            <pc:sldMk cId="1380674543" sldId="256"/>
+            <ac:spMk id="76" creationId="{36CCD4FD-C539-D5EE-73D0-29235DA41DB6}"/>
+          </ac:spMkLst>
+        </pc:spChg>
+        <pc:spChg chg="add del mod">
+          <ac:chgData name="Fatima Pillosu" userId="a6295d4dc9e22643" providerId="LiveId" clId="{0EC97EC2-C770-4AE8-9D0C-3702CDF83D14}" dt="2025-05-25T20:56:11.319" v="89" actId="21"/>
+          <ac:spMkLst>
+            <pc:docMk/>
+            <pc:sldMk cId="1380674543" sldId="256"/>
+            <ac:spMk id="77" creationId="{E464C751-1730-9A7E-ECC2-2153B2204BBA}"/>
+          </ac:spMkLst>
+        </pc:spChg>
+        <pc:spChg chg="add del mod">
+          <ac:chgData name="Fatima Pillosu" userId="a6295d4dc9e22643" providerId="LiveId" clId="{0EC97EC2-C770-4AE8-9D0C-3702CDF83D14}" dt="2025-05-25T20:56:11.319" v="89" actId="21"/>
+          <ac:spMkLst>
+            <pc:docMk/>
+            <pc:sldMk cId="1380674543" sldId="256"/>
+            <ac:spMk id="78" creationId="{99BDB8A4-0494-689D-2507-94CDCEB8D0C2}"/>
+          </ac:spMkLst>
+        </pc:spChg>
+        <pc:spChg chg="add del mod">
+          <ac:chgData name="Fatima Pillosu" userId="a6295d4dc9e22643" providerId="LiveId" clId="{0EC97EC2-C770-4AE8-9D0C-3702CDF83D14}" dt="2025-05-25T20:56:11.319" v="89" actId="21"/>
+          <ac:spMkLst>
+            <pc:docMk/>
+            <pc:sldMk cId="1380674543" sldId="256"/>
+            <ac:spMk id="79" creationId="{22C4AD5E-E154-1EAD-C284-141D4E15EB00}"/>
+          </ac:spMkLst>
+        </pc:spChg>
+        <pc:spChg chg="add del mod">
+          <ac:chgData name="Fatima Pillosu" userId="a6295d4dc9e22643" providerId="LiveId" clId="{0EC97EC2-C770-4AE8-9D0C-3702CDF83D14}" dt="2025-05-25T20:56:11.319" v="89" actId="21"/>
+          <ac:spMkLst>
+            <pc:docMk/>
+            <pc:sldMk cId="1380674543" sldId="256"/>
+            <ac:spMk id="80" creationId="{64644FAA-9682-8175-4D83-E0FAEBF5AECF}"/>
+          </ac:spMkLst>
+        </pc:spChg>
+        <pc:spChg chg="add del mod">
+          <ac:chgData name="Fatima Pillosu" userId="a6295d4dc9e22643" providerId="LiveId" clId="{0EC97EC2-C770-4AE8-9D0C-3702CDF83D14}" dt="2025-05-25T20:56:11.319" v="89" actId="21"/>
+          <ac:spMkLst>
+            <pc:docMk/>
+            <pc:sldMk cId="1380674543" sldId="256"/>
+            <ac:spMk id="81" creationId="{F606AFF2-A448-29EC-8740-4E64AAE7AB72}"/>
+          </ac:spMkLst>
+        </pc:spChg>
+        <pc:spChg chg="add del mod">
+          <ac:chgData name="Fatima Pillosu" userId="a6295d4dc9e22643" providerId="LiveId" clId="{0EC97EC2-C770-4AE8-9D0C-3702CDF83D14}" dt="2025-05-25T20:56:11.319" v="89" actId="21"/>
+          <ac:spMkLst>
+            <pc:docMk/>
+            <pc:sldMk cId="1380674543" sldId="256"/>
+            <ac:spMk id="82" creationId="{47CED736-C2A1-36CE-3DF2-F463782B7FF3}"/>
+          </ac:spMkLst>
+        </pc:spChg>
+        <pc:spChg chg="add del mod">
+          <ac:chgData name="Fatima Pillosu" userId="a6295d4dc9e22643" providerId="LiveId" clId="{0EC97EC2-C770-4AE8-9D0C-3702CDF83D14}" dt="2025-05-25T20:56:11.319" v="89" actId="21"/>
+          <ac:spMkLst>
+            <pc:docMk/>
+            <pc:sldMk cId="1380674543" sldId="256"/>
+            <ac:spMk id="83" creationId="{59215346-0A39-CC39-D2D8-603954054EC6}"/>
+          </ac:spMkLst>
+        </pc:spChg>
+        <pc:spChg chg="add del mod">
+          <ac:chgData name="Fatima Pillosu" userId="a6295d4dc9e22643" providerId="LiveId" clId="{0EC97EC2-C770-4AE8-9D0C-3702CDF83D14}" dt="2025-05-25T20:56:11.319" v="89" actId="21"/>
+          <ac:spMkLst>
+            <pc:docMk/>
+            <pc:sldMk cId="1380674543" sldId="256"/>
+            <ac:spMk id="84" creationId="{C7F77EE4-03F2-CE29-7AAC-D2E58CAD0D6F}"/>
+          </ac:spMkLst>
+        </pc:spChg>
+        <pc:spChg chg="add del mod">
+          <ac:chgData name="Fatima Pillosu" userId="a6295d4dc9e22643" providerId="LiveId" clId="{0EC97EC2-C770-4AE8-9D0C-3702CDF83D14}" dt="2025-05-25T20:56:11.319" v="89" actId="21"/>
+          <ac:spMkLst>
+            <pc:docMk/>
+            <pc:sldMk cId="1380674543" sldId="256"/>
+            <ac:spMk id="85" creationId="{858257CA-1ABF-6E30-7CB5-A356C4E21C51}"/>
+          </ac:spMkLst>
+        </pc:spChg>
+        <pc:spChg chg="add del mod">
+          <ac:chgData name="Fatima Pillosu" userId="a6295d4dc9e22643" providerId="LiveId" clId="{0EC97EC2-C770-4AE8-9D0C-3702CDF83D14}" dt="2025-05-25T20:56:11.319" v="89" actId="21"/>
+          <ac:spMkLst>
+            <pc:docMk/>
+            <pc:sldMk cId="1380674543" sldId="256"/>
+            <ac:spMk id="86" creationId="{C9DC7499-5DE0-F436-0A8B-A070DEA8096C}"/>
+          </ac:spMkLst>
+        </pc:spChg>
+        <pc:spChg chg="add del mod">
+          <ac:chgData name="Fatima Pillosu" userId="a6295d4dc9e22643" providerId="LiveId" clId="{0EC97EC2-C770-4AE8-9D0C-3702CDF83D14}" dt="2025-05-25T20:56:11.319" v="89" actId="21"/>
+          <ac:spMkLst>
+            <pc:docMk/>
+            <pc:sldMk cId="1380674543" sldId="256"/>
+            <ac:spMk id="87" creationId="{ECD1FCB4-C01C-4739-8CFD-EEF0675DC2CE}"/>
+          </ac:spMkLst>
+        </pc:spChg>
+        <pc:spChg chg="add del mod">
+          <ac:chgData name="Fatima Pillosu" userId="a6295d4dc9e22643" providerId="LiveId" clId="{0EC97EC2-C770-4AE8-9D0C-3702CDF83D14}" dt="2025-05-25T20:56:09.500" v="88" actId="478"/>
+          <ac:spMkLst>
+            <pc:docMk/>
+            <pc:sldMk cId="1380674543" sldId="256"/>
+            <ac:spMk id="88" creationId="{6919FE3E-27F5-266F-1564-232239C0614A}"/>
+          </ac:spMkLst>
+        </pc:spChg>
+        <pc:spChg chg="add mod">
+          <ac:chgData name="Fatima Pillosu" userId="a6295d4dc9e22643" providerId="LiveId" clId="{0EC97EC2-C770-4AE8-9D0C-3702CDF83D14}" dt="2025-05-25T20:56:46.429" v="98" actId="1037"/>
+          <ac:spMkLst>
+            <pc:docMk/>
+            <pc:sldMk cId="1380674543" sldId="256"/>
+            <ac:spMk id="91" creationId="{0C7866F8-3D28-D23F-94F4-31434FC45C8D}"/>
+          </ac:spMkLst>
+        </pc:spChg>
+        <pc:spChg chg="add mod">
+          <ac:chgData name="Fatima Pillosu" userId="a6295d4dc9e22643" providerId="LiveId" clId="{0EC97EC2-C770-4AE8-9D0C-3702CDF83D14}" dt="2025-05-25T20:56:46.429" v="98" actId="1037"/>
+          <ac:spMkLst>
+            <pc:docMk/>
+            <pc:sldMk cId="1380674543" sldId="256"/>
+            <ac:spMk id="92" creationId="{12F23E37-D850-2205-D764-E65B9EEE2D3F}"/>
+          </ac:spMkLst>
+        </pc:spChg>
+        <pc:spChg chg="add mod">
+          <ac:chgData name="Fatima Pillosu" userId="a6295d4dc9e22643" providerId="LiveId" clId="{0EC97EC2-C770-4AE8-9D0C-3702CDF83D14}" dt="2025-05-25T20:56:46.429" v="98" actId="1037"/>
+          <ac:spMkLst>
+            <pc:docMk/>
+            <pc:sldMk cId="1380674543" sldId="256"/>
+            <ac:spMk id="93" creationId="{47E1CCA9-1FE1-AC39-2A65-B2530877FE67}"/>
+          </ac:spMkLst>
+        </pc:spChg>
+        <pc:spChg chg="add mod">
+          <ac:chgData name="Fatima Pillosu" userId="a6295d4dc9e22643" providerId="LiveId" clId="{0EC97EC2-C770-4AE8-9D0C-3702CDF83D14}" dt="2025-05-25T20:56:46.429" v="98" actId="1037"/>
+          <ac:spMkLst>
+            <pc:docMk/>
+            <pc:sldMk cId="1380674543" sldId="256"/>
+            <ac:spMk id="94" creationId="{1BF944C8-72B7-EE1A-6F7B-CF42B3774EC5}"/>
+          </ac:spMkLst>
+        </pc:spChg>
+        <pc:spChg chg="add mod">
+          <ac:chgData name="Fatima Pillosu" userId="a6295d4dc9e22643" providerId="LiveId" clId="{0EC97EC2-C770-4AE8-9D0C-3702CDF83D14}" dt="2025-05-25T20:56:46.429" v="98" actId="1037"/>
+          <ac:spMkLst>
+            <pc:docMk/>
+            <pc:sldMk cId="1380674543" sldId="256"/>
+            <ac:spMk id="95" creationId="{E426F851-70D0-C74A-EE11-AF956E60CFE7}"/>
+          </ac:spMkLst>
+        </pc:spChg>
+        <pc:spChg chg="add mod">
+          <ac:chgData name="Fatima Pillosu" userId="a6295d4dc9e22643" providerId="LiveId" clId="{0EC97EC2-C770-4AE8-9D0C-3702CDF83D14}" dt="2025-05-25T20:56:46.429" v="98" actId="1037"/>
+          <ac:spMkLst>
+            <pc:docMk/>
+            <pc:sldMk cId="1380674543" sldId="256"/>
+            <ac:spMk id="96" creationId="{27EB65F3-73F5-B07A-A818-9796C53071D9}"/>
+          </ac:spMkLst>
+        </pc:spChg>
+        <pc:spChg chg="add mod">
+          <ac:chgData name="Fatima Pillosu" userId="a6295d4dc9e22643" providerId="LiveId" clId="{0EC97EC2-C770-4AE8-9D0C-3702CDF83D14}" dt="2025-05-25T20:56:46.429" v="98" actId="1037"/>
+          <ac:spMkLst>
+            <pc:docMk/>
+            <pc:sldMk cId="1380674543" sldId="256"/>
+            <ac:spMk id="97" creationId="{F8E8BF63-273E-0C12-2314-78FB9D7EA77C}"/>
+          </ac:spMkLst>
+        </pc:spChg>
+        <pc:spChg chg="add mod">
+          <ac:chgData name="Fatima Pillosu" userId="a6295d4dc9e22643" providerId="LiveId" clId="{0EC97EC2-C770-4AE8-9D0C-3702CDF83D14}" dt="2025-05-25T20:56:46.429" v="98" actId="1037"/>
+          <ac:spMkLst>
+            <pc:docMk/>
+            <pc:sldMk cId="1380674543" sldId="256"/>
+            <ac:spMk id="98" creationId="{31D547D6-3E3A-6367-A806-E3B56F1B5A30}"/>
+          </ac:spMkLst>
+        </pc:spChg>
+        <pc:spChg chg="add mod">
+          <ac:chgData name="Fatima Pillosu" userId="a6295d4dc9e22643" providerId="LiveId" clId="{0EC97EC2-C770-4AE8-9D0C-3702CDF83D14}" dt="2025-05-25T20:56:46.429" v="98" actId="1037"/>
+          <ac:spMkLst>
+            <pc:docMk/>
+            <pc:sldMk cId="1380674543" sldId="256"/>
+            <ac:spMk id="99" creationId="{8AF1D376-2A82-A44F-4F2C-5830FEE78451}"/>
+          </ac:spMkLst>
+        </pc:spChg>
+        <pc:spChg chg="add mod">
+          <ac:chgData name="Fatima Pillosu" userId="a6295d4dc9e22643" providerId="LiveId" clId="{0EC97EC2-C770-4AE8-9D0C-3702CDF83D14}" dt="2025-05-25T20:56:46.429" v="98" actId="1037"/>
+          <ac:spMkLst>
+            <pc:docMk/>
+            <pc:sldMk cId="1380674543" sldId="256"/>
+            <ac:spMk id="100" creationId="{28538DD9-DAB7-10B4-2328-9112FCBAC9B9}"/>
+          </ac:spMkLst>
+        </pc:spChg>
+        <pc:spChg chg="add mod">
+          <ac:chgData name="Fatima Pillosu" userId="a6295d4dc9e22643" providerId="LiveId" clId="{0EC97EC2-C770-4AE8-9D0C-3702CDF83D14}" dt="2025-05-25T20:56:46.429" v="98" actId="1037"/>
+          <ac:spMkLst>
+            <pc:docMk/>
+            <pc:sldMk cId="1380674543" sldId="256"/>
+            <ac:spMk id="101" creationId="{9F366357-E9B2-2CA5-1755-68B795391F73}"/>
+          </ac:spMkLst>
+        </pc:spChg>
+        <pc:spChg chg="add mod">
+          <ac:chgData name="Fatima Pillosu" userId="a6295d4dc9e22643" providerId="LiveId" clId="{0EC97EC2-C770-4AE8-9D0C-3702CDF83D14}" dt="2025-05-25T20:56:46.429" v="98" actId="1037"/>
+          <ac:spMkLst>
+            <pc:docMk/>
+            <pc:sldMk cId="1380674543" sldId="256"/>
+            <ac:spMk id="102" creationId="{344C4B38-03CB-55F0-EA16-6F4270C3443B}"/>
+          </ac:spMkLst>
+        </pc:spChg>
+        <pc:spChg chg="add mod">
+          <ac:chgData name="Fatima Pillosu" userId="a6295d4dc9e22643" providerId="LiveId" clId="{0EC97EC2-C770-4AE8-9D0C-3702CDF83D14}" dt="2025-05-25T20:56:46.429" v="98" actId="1037"/>
+          <ac:spMkLst>
+            <pc:docMk/>
+            <pc:sldMk cId="1380674543" sldId="256"/>
+            <ac:spMk id="103" creationId="{BAB5FA82-2A90-06EE-6258-9D203AB1BDB8}"/>
+          </ac:spMkLst>
+        </pc:spChg>
+        <pc:spChg chg="add mod">
+          <ac:chgData name="Fatima Pillosu" userId="a6295d4dc9e22643" providerId="LiveId" clId="{0EC97EC2-C770-4AE8-9D0C-3702CDF83D14}" dt="2025-05-25T20:56:46.429" v="98" actId="1037"/>
+          <ac:spMkLst>
+            <pc:docMk/>
+            <pc:sldMk cId="1380674543" sldId="256"/>
+            <ac:spMk id="105" creationId="{B6871B03-CD01-1DE9-106B-BECB69B252AC}"/>
+          </ac:spMkLst>
+        </pc:spChg>
+        <pc:spChg chg="add mod">
+          <ac:chgData name="Fatima Pillosu" userId="a6295d4dc9e22643" providerId="LiveId" clId="{0EC97EC2-C770-4AE8-9D0C-3702CDF83D14}" dt="2025-05-25T20:56:46.429" v="98" actId="1037"/>
+          <ac:spMkLst>
+            <pc:docMk/>
+            <pc:sldMk cId="1380674543" sldId="256"/>
+            <ac:spMk id="106" creationId="{ED01783E-4F4C-A8C9-3F22-8A910D6F8F90}"/>
+          </ac:spMkLst>
+        </pc:spChg>
+        <pc:spChg chg="add mod">
+          <ac:chgData name="Fatima Pillosu" userId="a6295d4dc9e22643" providerId="LiveId" clId="{0EC97EC2-C770-4AE8-9D0C-3702CDF83D14}" dt="2025-05-25T20:56:46.429" v="98" actId="1037"/>
+          <ac:spMkLst>
+            <pc:docMk/>
+            <pc:sldMk cId="1380674543" sldId="256"/>
+            <ac:spMk id="107" creationId="{6ECAE385-D2E4-A5F8-D03D-40BE92503682}"/>
+          </ac:spMkLst>
+        </pc:spChg>
+        <pc:spChg chg="add mod">
+          <ac:chgData name="Fatima Pillosu" userId="a6295d4dc9e22643" providerId="LiveId" clId="{0EC97EC2-C770-4AE8-9D0C-3702CDF83D14}" dt="2025-05-25T20:56:46.429" v="98" actId="1037"/>
+          <ac:spMkLst>
+            <pc:docMk/>
+            <pc:sldMk cId="1380674543" sldId="256"/>
+            <ac:spMk id="108" creationId="{377CE1CC-2AA5-9330-A970-BB92ACF08CEE}"/>
+          </ac:spMkLst>
+        </pc:spChg>
+        <pc:spChg chg="add mod">
+          <ac:chgData name="Fatima Pillosu" userId="a6295d4dc9e22643" providerId="LiveId" clId="{0EC97EC2-C770-4AE8-9D0C-3702CDF83D14}" dt="2025-05-25T20:56:46.429" v="98" actId="1037"/>
+          <ac:spMkLst>
+            <pc:docMk/>
+            <pc:sldMk cId="1380674543" sldId="256"/>
+            <ac:spMk id="109" creationId="{89D16ACE-F790-DC3D-1B03-3F9F7A9E10BB}"/>
+          </ac:spMkLst>
+        </pc:spChg>
+        <pc:spChg chg="add mod">
+          <ac:chgData name="Fatima Pillosu" userId="a6295d4dc9e22643" providerId="LiveId" clId="{0EC97EC2-C770-4AE8-9D0C-3702CDF83D14}" dt="2025-05-25T20:56:46.429" v="98" actId="1037"/>
+          <ac:spMkLst>
+            <pc:docMk/>
+            <pc:sldMk cId="1380674543" sldId="256"/>
+            <ac:spMk id="110" creationId="{BD98A7DA-E44F-537E-878D-920D528D2374}"/>
+          </ac:spMkLst>
+        </pc:spChg>
+        <pc:spChg chg="add mod">
+          <ac:chgData name="Fatima Pillosu" userId="a6295d4dc9e22643" providerId="LiveId" clId="{0EC97EC2-C770-4AE8-9D0C-3702CDF83D14}" dt="2025-05-25T20:56:46.429" v="98" actId="1037"/>
+          <ac:spMkLst>
+            <pc:docMk/>
+            <pc:sldMk cId="1380674543" sldId="256"/>
+            <ac:spMk id="111" creationId="{D91A9B1A-3935-E2D1-6A45-A04DB53FA9AF}"/>
+          </ac:spMkLst>
+        </pc:spChg>
+        <pc:spChg chg="add mod">
+          <ac:chgData name="Fatima Pillosu" userId="a6295d4dc9e22643" providerId="LiveId" clId="{0EC97EC2-C770-4AE8-9D0C-3702CDF83D14}" dt="2025-05-25T20:56:46.429" v="98" actId="1037"/>
+          <ac:spMkLst>
+            <pc:docMk/>
+            <pc:sldMk cId="1380674543" sldId="256"/>
+            <ac:spMk id="112" creationId="{FD0F6C0C-3187-59C2-B8AB-8CE80E69B405}"/>
+          </ac:spMkLst>
+        </pc:spChg>
+        <pc:spChg chg="add mod">
+          <ac:chgData name="Fatima Pillosu" userId="a6295d4dc9e22643" providerId="LiveId" clId="{0EC97EC2-C770-4AE8-9D0C-3702CDF83D14}" dt="2025-05-25T20:56:46.429" v="98" actId="1037"/>
+          <ac:spMkLst>
+            <pc:docMk/>
+            <pc:sldMk cId="1380674543" sldId="256"/>
+            <ac:spMk id="113" creationId="{B9263D22-8B6B-1445-8A0C-5061E90D79EF}"/>
+          </ac:spMkLst>
+        </pc:spChg>
+        <pc:spChg chg="add mod">
+          <ac:chgData name="Fatima Pillosu" userId="a6295d4dc9e22643" providerId="LiveId" clId="{0EC97EC2-C770-4AE8-9D0C-3702CDF83D14}" dt="2025-05-25T20:56:46.429" v="98" actId="1037"/>
+          <ac:spMkLst>
+            <pc:docMk/>
+            <pc:sldMk cId="1380674543" sldId="256"/>
+            <ac:spMk id="114" creationId="{734D8A0F-DA4D-8309-F970-E2530B211CA4}"/>
+          </ac:spMkLst>
+        </pc:spChg>
+        <pc:spChg chg="add mod">
+          <ac:chgData name="Fatima Pillosu" userId="a6295d4dc9e22643" providerId="LiveId" clId="{0EC97EC2-C770-4AE8-9D0C-3702CDF83D14}" dt="2025-05-25T20:56:46.429" v="98" actId="1037"/>
+          <ac:spMkLst>
+            <pc:docMk/>
+            <pc:sldMk cId="1380674543" sldId="256"/>
+            <ac:spMk id="115" creationId="{D6D9CBDE-E9C7-3D16-96D4-8E67B270EAE3}"/>
+          </ac:spMkLst>
+        </pc:spChg>
+        <pc:spChg chg="add mod">
+          <ac:chgData name="Fatima Pillosu" userId="a6295d4dc9e22643" providerId="LiveId" clId="{0EC97EC2-C770-4AE8-9D0C-3702CDF83D14}" dt="2025-05-25T20:56:46.429" v="98" actId="1037"/>
+          <ac:spMkLst>
+            <pc:docMk/>
+            <pc:sldMk cId="1380674543" sldId="256"/>
+            <ac:spMk id="116" creationId="{A7B8CD3B-CE6E-F022-E60D-BF8E98B05737}"/>
+          </ac:spMkLst>
+        </pc:spChg>
+        <pc:spChg chg="add mod">
+          <ac:chgData name="Fatima Pillosu" userId="a6295d4dc9e22643" providerId="LiveId" clId="{0EC97EC2-C770-4AE8-9D0C-3702CDF83D14}" dt="2025-05-25T20:56:46.429" v="98" actId="1037"/>
+          <ac:spMkLst>
+            <pc:docMk/>
+            <pc:sldMk cId="1380674543" sldId="256"/>
+            <ac:spMk id="117" creationId="{3BA2A2CA-0B12-CD6C-AFDA-1197C74E9C14}"/>
+          </ac:spMkLst>
+        </pc:spChg>
+        <pc:spChg chg="add mod">
+          <ac:chgData name="Fatima Pillosu" userId="a6295d4dc9e22643" providerId="LiveId" clId="{0EC97EC2-C770-4AE8-9D0C-3702CDF83D14}" dt="2025-05-25T20:56:46.429" v="98" actId="1037"/>
+          <ac:spMkLst>
+            <pc:docMk/>
+            <pc:sldMk cId="1380674543" sldId="256"/>
+            <ac:spMk id="118" creationId="{457BE35D-A1A5-58C6-2F5E-A07F0ABA918B}"/>
+          </ac:spMkLst>
+        </pc:spChg>
+        <pc:spChg chg="add mod">
+          <ac:chgData name="Fatima Pillosu" userId="a6295d4dc9e22643" providerId="LiveId" clId="{0EC97EC2-C770-4AE8-9D0C-3702CDF83D14}" dt="2025-05-25T20:56:46.429" v="98" actId="1037"/>
+          <ac:spMkLst>
+            <pc:docMk/>
+            <pc:sldMk cId="1380674543" sldId="256"/>
+            <ac:spMk id="119" creationId="{3E807561-1BE6-323C-01CD-ACB63198B423}"/>
+          </ac:spMkLst>
+        </pc:spChg>
+        <pc:spChg chg="add mod">
+          <ac:chgData name="Fatima Pillosu" userId="a6295d4dc9e22643" providerId="LiveId" clId="{0EC97EC2-C770-4AE8-9D0C-3702CDF83D14}" dt="2025-05-25T20:56:46.429" v="98" actId="1037"/>
+          <ac:spMkLst>
+            <pc:docMk/>
+            <pc:sldMk cId="1380674543" sldId="256"/>
+            <ac:spMk id="120" creationId="{36CCD4FD-C539-D5EE-73D0-29235DA41DB6}"/>
+          </ac:spMkLst>
+        </pc:spChg>
+        <pc:spChg chg="add mod">
+          <ac:chgData name="Fatima Pillosu" userId="a6295d4dc9e22643" providerId="LiveId" clId="{0EC97EC2-C770-4AE8-9D0C-3702CDF83D14}" dt="2025-05-25T20:56:46.429" v="98" actId="1037"/>
+          <ac:spMkLst>
+            <pc:docMk/>
+            <pc:sldMk cId="1380674543" sldId="256"/>
+            <ac:spMk id="121" creationId="{E464C751-1730-9A7E-ECC2-2153B2204BBA}"/>
+          </ac:spMkLst>
+        </pc:spChg>
+        <pc:spChg chg="add mod">
+          <ac:chgData name="Fatima Pillosu" userId="a6295d4dc9e22643" providerId="LiveId" clId="{0EC97EC2-C770-4AE8-9D0C-3702CDF83D14}" dt="2025-05-25T20:56:46.429" v="98" actId="1037"/>
+          <ac:spMkLst>
+            <pc:docMk/>
+            <pc:sldMk cId="1380674543" sldId="256"/>
+            <ac:spMk id="122" creationId="{99BDB8A4-0494-689D-2507-94CDCEB8D0C2}"/>
+          </ac:spMkLst>
+        </pc:spChg>
+        <pc:spChg chg="add mod">
+          <ac:chgData name="Fatima Pillosu" userId="a6295d4dc9e22643" providerId="LiveId" clId="{0EC97EC2-C770-4AE8-9D0C-3702CDF83D14}" dt="2025-05-25T20:56:46.429" v="98" actId="1037"/>
+          <ac:spMkLst>
+            <pc:docMk/>
+            <pc:sldMk cId="1380674543" sldId="256"/>
+            <ac:spMk id="123" creationId="{22C4AD5E-E154-1EAD-C284-141D4E15EB00}"/>
+          </ac:spMkLst>
+        </pc:spChg>
+        <pc:spChg chg="add mod">
+          <ac:chgData name="Fatima Pillosu" userId="a6295d4dc9e22643" providerId="LiveId" clId="{0EC97EC2-C770-4AE8-9D0C-3702CDF83D14}" dt="2025-05-25T20:56:46.429" v="98" actId="1037"/>
+          <ac:spMkLst>
+            <pc:docMk/>
+            <pc:sldMk cId="1380674543" sldId="256"/>
+            <ac:spMk id="124" creationId="{64644FAA-9682-8175-4D83-E0FAEBF5AECF}"/>
+          </ac:spMkLst>
+        </pc:spChg>
+        <pc:spChg chg="add mod">
+          <ac:chgData name="Fatima Pillosu" userId="a6295d4dc9e22643" providerId="LiveId" clId="{0EC97EC2-C770-4AE8-9D0C-3702CDF83D14}" dt="2025-05-25T20:56:46.429" v="98" actId="1037"/>
+          <ac:spMkLst>
+            <pc:docMk/>
+            <pc:sldMk cId="1380674543" sldId="256"/>
+            <ac:spMk id="125" creationId="{F606AFF2-A448-29EC-8740-4E64AAE7AB72}"/>
+          </ac:spMkLst>
+        </pc:spChg>
+        <pc:spChg chg="add mod">
+          <ac:chgData name="Fatima Pillosu" userId="a6295d4dc9e22643" providerId="LiveId" clId="{0EC97EC2-C770-4AE8-9D0C-3702CDF83D14}" dt="2025-05-25T20:56:46.429" v="98" actId="1037"/>
+          <ac:spMkLst>
+            <pc:docMk/>
+            <pc:sldMk cId="1380674543" sldId="256"/>
+            <ac:spMk id="126" creationId="{47CED736-C2A1-36CE-3DF2-F463782B7FF3}"/>
+          </ac:spMkLst>
+        </pc:spChg>
+        <pc:spChg chg="add mod">
+          <ac:chgData name="Fatima Pillosu" userId="a6295d4dc9e22643" providerId="LiveId" clId="{0EC97EC2-C770-4AE8-9D0C-3702CDF83D14}" dt="2025-05-25T20:56:46.429" v="98" actId="1037"/>
+          <ac:spMkLst>
+            <pc:docMk/>
+            <pc:sldMk cId="1380674543" sldId="256"/>
+            <ac:spMk id="127" creationId="{59215346-0A39-CC39-D2D8-603954054EC6}"/>
+          </ac:spMkLst>
+        </pc:spChg>
+        <pc:spChg chg="add mod">
+          <ac:chgData name="Fatima Pillosu" userId="a6295d4dc9e22643" providerId="LiveId" clId="{0EC97EC2-C770-4AE8-9D0C-3702CDF83D14}" dt="2025-05-25T20:56:46.429" v="98" actId="1037"/>
+          <ac:spMkLst>
+            <pc:docMk/>
+            <pc:sldMk cId="1380674543" sldId="256"/>
+            <ac:spMk id="128" creationId="{C7F77EE4-03F2-CE29-7AAC-D2E58CAD0D6F}"/>
+          </ac:spMkLst>
+        </pc:spChg>
+        <pc:spChg chg="add mod">
+          <ac:chgData name="Fatima Pillosu" userId="a6295d4dc9e22643" providerId="LiveId" clId="{0EC97EC2-C770-4AE8-9D0C-3702CDF83D14}" dt="2025-05-25T20:56:46.429" v="98" actId="1037"/>
+          <ac:spMkLst>
+            <pc:docMk/>
+            <pc:sldMk cId="1380674543" sldId="256"/>
+            <ac:spMk id="129" creationId="{858257CA-1ABF-6E30-7CB5-A356C4E21C51}"/>
+          </ac:spMkLst>
+        </pc:spChg>
+        <pc:spChg chg="add mod">
+          <ac:chgData name="Fatima Pillosu" userId="a6295d4dc9e22643" providerId="LiveId" clId="{0EC97EC2-C770-4AE8-9D0C-3702CDF83D14}" dt="2025-05-25T20:56:46.429" v="98" actId="1037"/>
+          <ac:spMkLst>
+            <pc:docMk/>
+            <pc:sldMk cId="1380674543" sldId="256"/>
+            <ac:spMk id="130" creationId="{C9DC7499-5DE0-F436-0A8B-A070DEA8096C}"/>
+          </ac:spMkLst>
+        </pc:spChg>
+        <pc:spChg chg="add mod">
+          <ac:chgData name="Fatima Pillosu" userId="a6295d4dc9e22643" providerId="LiveId" clId="{0EC97EC2-C770-4AE8-9D0C-3702CDF83D14}" dt="2025-05-25T20:56:46.429" v="98" actId="1037"/>
+          <ac:spMkLst>
+            <pc:docMk/>
+            <pc:sldMk cId="1380674543" sldId="256"/>
+            <ac:spMk id="131" creationId="{ECD1FCB4-C01C-4739-8CFD-EEF0675DC2CE}"/>
           </ac:spMkLst>
         </pc:spChg>
         <pc:spChg chg="del mod">
@@ -4447,28 +5095,76 @@
             <ac:spMk id="316" creationId="{B8007B7D-F052-FFD1-CAEA-9E7123846D05}"/>
           </ac:spMkLst>
         </pc:spChg>
-        <pc:picChg chg="add mod">
-          <ac:chgData name="Fatima Pillosu" userId="a6295d4dc9e22643" providerId="LiveId" clId="{0EC97EC2-C770-4AE8-9D0C-3702CDF83D14}" dt="2025-05-14T22:33:34.258" v="80"/>
+        <pc:picChg chg="add del mod">
+          <ac:chgData name="Fatima Pillosu" userId="a6295d4dc9e22643" providerId="LiveId" clId="{0EC97EC2-C770-4AE8-9D0C-3702CDF83D14}" dt="2025-05-25T20:56:11.319" v="89" actId="21"/>
+          <ac:picMkLst>
+            <pc:docMk/>
+            <pc:sldMk cId="1380674543" sldId="256"/>
+            <ac:picMk id="2" creationId="{D26D42B5-73FE-CAB1-1164-A632119A173E}"/>
+          </ac:picMkLst>
+        </pc:picChg>
+        <pc:picChg chg="add del mod">
+          <ac:chgData name="Fatima Pillosu" userId="a6295d4dc9e22643" providerId="LiveId" clId="{0EC97EC2-C770-4AE8-9D0C-3702CDF83D14}" dt="2025-05-25T20:52:53.842" v="81" actId="21"/>
           <ac:picMkLst>
             <pc:docMk/>
             <pc:sldMk cId="1380674543" sldId="256"/>
             <ac:picMk id="3" creationId="{D26D42B5-73FE-CAB1-1164-A632119A173E}"/>
           </ac:picMkLst>
         </pc:picChg>
-        <pc:picChg chg="add mod">
-          <ac:chgData name="Fatima Pillosu" userId="a6295d4dc9e22643" providerId="LiveId" clId="{0EC97EC2-C770-4AE8-9D0C-3702CDF83D14}" dt="2025-05-14T22:33:34.258" v="80"/>
+        <pc:picChg chg="add del mod">
+          <ac:chgData name="Fatima Pillosu" userId="a6295d4dc9e22643" providerId="LiveId" clId="{0EC97EC2-C770-4AE8-9D0C-3702CDF83D14}" dt="2025-05-25T20:52:53.842" v="81" actId="21"/>
           <ac:picMkLst>
             <pc:docMk/>
             <pc:sldMk cId="1380674543" sldId="256"/>
             <ac:picMk id="4" creationId="{E9C6D329-88F6-78AE-5643-50A8169BD267}"/>
           </ac:picMkLst>
         </pc:picChg>
+        <pc:picChg chg="add del mod">
+          <ac:chgData name="Fatima Pillosu" userId="a6295d4dc9e22643" providerId="LiveId" clId="{0EC97EC2-C770-4AE8-9D0C-3702CDF83D14}" dt="2025-05-25T20:52:53.842" v="81" actId="21"/>
+          <ac:picMkLst>
+            <pc:docMk/>
+            <pc:sldMk cId="1380674543" sldId="256"/>
+            <ac:picMk id="18" creationId="{1AB615E8-0B17-7B4A-E110-256F4C39CFC6}"/>
+          </ac:picMkLst>
+        </pc:picChg>
+        <pc:picChg chg="add del mod">
+          <ac:chgData name="Fatima Pillosu" userId="a6295d4dc9e22643" providerId="LiveId" clId="{0EC97EC2-C770-4AE8-9D0C-3702CDF83D14}" dt="2025-05-25T20:56:11.319" v="89" actId="21"/>
+          <ac:picMkLst>
+            <pc:docMk/>
+            <pc:sldMk cId="1380674543" sldId="256"/>
+            <ac:picMk id="46" creationId="{E9C6D329-88F6-78AE-5643-50A8169BD267}"/>
+          </ac:picMkLst>
+        </pc:picChg>
+        <pc:picChg chg="add del mod">
+          <ac:chgData name="Fatima Pillosu" userId="a6295d4dc9e22643" providerId="LiveId" clId="{0EC97EC2-C770-4AE8-9D0C-3702CDF83D14}" dt="2025-05-25T20:56:11.319" v="89" actId="21"/>
+          <ac:picMkLst>
+            <pc:docMk/>
+            <pc:sldMk cId="1380674543" sldId="256"/>
+            <ac:picMk id="60" creationId="{1AB615E8-0B17-7B4A-E110-256F4C39CFC6}"/>
+          </ac:picMkLst>
+        </pc:picChg>
         <pc:picChg chg="add mod">
-          <ac:chgData name="Fatima Pillosu" userId="a6295d4dc9e22643" providerId="LiveId" clId="{0EC97EC2-C770-4AE8-9D0C-3702CDF83D14}" dt="2025-05-14T22:33:34.258" v="80"/>
+          <ac:chgData name="Fatima Pillosu" userId="a6295d4dc9e22643" providerId="LiveId" clId="{0EC97EC2-C770-4AE8-9D0C-3702CDF83D14}" dt="2025-05-25T20:56:46.429" v="98" actId="1037"/>
           <ac:picMkLst>
             <pc:docMk/>
             <pc:sldMk cId="1380674543" sldId="256"/>
-            <ac:picMk id="18" creationId="{1AB615E8-0B17-7B4A-E110-256F4C39CFC6}"/>
+            <ac:picMk id="89" creationId="{D26D42B5-73FE-CAB1-1164-A632119A173E}"/>
+          </ac:picMkLst>
+        </pc:picChg>
+        <pc:picChg chg="add mod">
+          <ac:chgData name="Fatima Pillosu" userId="a6295d4dc9e22643" providerId="LiveId" clId="{0EC97EC2-C770-4AE8-9D0C-3702CDF83D14}" dt="2025-05-25T20:56:46.429" v="98" actId="1037"/>
+          <ac:picMkLst>
+            <pc:docMk/>
+            <pc:sldMk cId="1380674543" sldId="256"/>
+            <ac:picMk id="90" creationId="{E9C6D329-88F6-78AE-5643-50A8169BD267}"/>
+          </ac:picMkLst>
+        </pc:picChg>
+        <pc:picChg chg="add mod">
+          <ac:chgData name="Fatima Pillosu" userId="a6295d4dc9e22643" providerId="LiveId" clId="{0EC97EC2-C770-4AE8-9D0C-3702CDF83D14}" dt="2025-05-25T20:56:46.429" v="98" actId="1037"/>
+          <ac:picMkLst>
+            <pc:docMk/>
+            <pc:sldMk cId="1380674543" sldId="256"/>
+            <ac:picMk id="104" creationId="{1AB615E8-0B17-7B4A-E110-256F4C39CFC6}"/>
           </ac:picMkLst>
         </pc:picChg>
         <pc:picChg chg="del mod">
@@ -5218,15 +5914,15 @@
         </p:nvSpPr>
         <p:spPr>
           <a:xfrm>
-            <a:off x="857250" y="350479"/>
-            <a:ext cx="5143500" cy="745572"/>
+            <a:off x="248365" y="739409"/>
+            <a:ext cx="2814796" cy="1572942"/>
           </a:xfrm>
         </p:spPr>
         <p:txBody>
           <a:bodyPr anchor="b"/>
           <a:lstStyle>
             <a:lvl1pPr algn="ctr">
-              <a:defRPr sz="1874"/>
+              <a:defRPr sz="2173"/>
             </a:lvl1pPr>
           </a:lstStyle>
           <a:p>
@@ -5250,8 +5946,8 @@
         </p:nvSpPr>
         <p:spPr>
           <a:xfrm>
-            <a:off x="857250" y="1124804"/>
-            <a:ext cx="5143500" cy="517042"/>
+            <a:off x="413941" y="2373009"/>
+            <a:ext cx="2483644" cy="1090810"/>
           </a:xfrm>
         </p:spPr>
         <p:txBody>
@@ -5259,39 +5955,39 @@
           <a:lstStyle>
             <a:lvl1pPr marL="0" indent="0" algn="ctr">
               <a:buNone/>
-              <a:defRPr sz="750"/>
+              <a:defRPr sz="869"/>
             </a:lvl1pPr>
-            <a:lvl2pPr marL="142784" indent="0" algn="ctr">
+            <a:lvl2pPr marL="165598" indent="0" algn="ctr">
               <a:buNone/>
-              <a:defRPr sz="625"/>
+              <a:defRPr sz="724"/>
             </a:lvl2pPr>
-            <a:lvl3pPr marL="285567" indent="0" algn="ctr">
+            <a:lvl3pPr marL="331196" indent="0" algn="ctr">
               <a:buNone/>
-              <a:defRPr sz="562"/>
+              <a:defRPr sz="652"/>
             </a:lvl3pPr>
-            <a:lvl4pPr marL="428351" indent="0" algn="ctr">
+            <a:lvl4pPr marL="496794" indent="0" algn="ctr">
               <a:buNone/>
-              <a:defRPr sz="500"/>
+              <a:defRPr sz="580"/>
             </a:lvl4pPr>
-            <a:lvl5pPr marL="571134" indent="0" algn="ctr">
+            <a:lvl5pPr marL="662391" indent="0" algn="ctr">
               <a:buNone/>
-              <a:defRPr sz="500"/>
+              <a:defRPr sz="580"/>
             </a:lvl5pPr>
-            <a:lvl6pPr marL="713918" indent="0" algn="ctr">
+            <a:lvl6pPr marL="827989" indent="0" algn="ctr">
               <a:buNone/>
-              <a:defRPr sz="500"/>
+              <a:defRPr sz="580"/>
             </a:lvl6pPr>
-            <a:lvl7pPr marL="856701" indent="0" algn="ctr">
+            <a:lvl7pPr marL="993587" indent="0" algn="ctr">
               <a:buNone/>
-              <a:defRPr sz="500"/>
+              <a:defRPr sz="580"/>
             </a:lvl7pPr>
-            <a:lvl8pPr marL="999485" indent="0" algn="ctr">
+            <a:lvl8pPr marL="1159185" indent="0" algn="ctr">
               <a:buNone/>
-              <a:defRPr sz="500"/>
+              <a:defRPr sz="580"/>
             </a:lvl8pPr>
-            <a:lvl9pPr marL="1142268" indent="0" algn="ctr">
+            <a:lvl9pPr marL="1324783" indent="0" algn="ctr">
               <a:buNone/>
-              <a:defRPr sz="500"/>
+              <a:defRPr sz="580"/>
             </a:lvl9pPr>
           </a:lstStyle>
           <a:p>
@@ -5320,7 +6016,7 @@
           <a:p>
             <a:fld id="{F808BE39-9590-4784-9593-CDA6D4690427}" type="datetimeFigureOut">
               <a:rPr lang="en-GB" smtClean="0"/>
-              <a:t>14/05/2025</a:t>
+              <a:t>25/05/2025</a:t>
             </a:fld>
             <a:endParaRPr lang="en-GB"/>
           </a:p>
@@ -5371,7 +6067,7 @@
     </p:spTree>
     <p:extLst>
       <p:ext uri="{BB962C8B-B14F-4D97-AF65-F5344CB8AC3E}">
-        <p14:creationId xmlns:p14="http://schemas.microsoft.com/office/powerpoint/2010/main" val="3565898989"/>
+        <p14:creationId xmlns:p14="http://schemas.microsoft.com/office/powerpoint/2010/main" val="38503435"/>
       </p:ext>
     </p:extLst>
   </p:cSld>
@@ -5490,7 +6186,7 @@
           <a:p>
             <a:fld id="{F808BE39-9590-4784-9593-CDA6D4690427}" type="datetimeFigureOut">
               <a:rPr lang="en-GB" smtClean="0"/>
-              <a:t>14/05/2025</a:t>
+              <a:t>25/05/2025</a:t>
             </a:fld>
             <a:endParaRPr lang="en-GB"/>
           </a:p>
@@ -5541,7 +6237,7 @@
     </p:spTree>
     <p:extLst>
       <p:ext uri="{BB962C8B-B14F-4D97-AF65-F5344CB8AC3E}">
-        <p14:creationId xmlns:p14="http://schemas.microsoft.com/office/powerpoint/2010/main" val="886264353"/>
+        <p14:creationId xmlns:p14="http://schemas.microsoft.com/office/powerpoint/2010/main" val="3066363502"/>
       </p:ext>
     </p:extLst>
   </p:cSld>
@@ -5580,8 +6276,8 @@
         </p:nvSpPr>
         <p:spPr>
           <a:xfrm>
-            <a:off x="4907756" y="114017"/>
-            <a:ext cx="1478756" cy="1814854"/>
+            <a:off x="2369810" y="240543"/>
+            <a:ext cx="714048" cy="3828817"/>
           </a:xfrm>
         </p:spPr>
         <p:txBody>
@@ -5608,8 +6304,8 @@
         </p:nvSpPr>
         <p:spPr>
           <a:xfrm>
-            <a:off x="471487" y="114017"/>
-            <a:ext cx="4350544" cy="1814854"/>
+            <a:off x="227667" y="240543"/>
+            <a:ext cx="2100749" cy="3828817"/>
           </a:xfrm>
         </p:spPr>
         <p:txBody>
@@ -5670,7 +6366,7 @@
           <a:p>
             <a:fld id="{F808BE39-9590-4784-9593-CDA6D4690427}" type="datetimeFigureOut">
               <a:rPr lang="en-GB" smtClean="0"/>
-              <a:t>14/05/2025</a:t>
+              <a:t>25/05/2025</a:t>
             </a:fld>
             <a:endParaRPr lang="en-GB"/>
           </a:p>
@@ -5721,7 +6417,7 @@
     </p:spTree>
     <p:extLst>
       <p:ext uri="{BB962C8B-B14F-4D97-AF65-F5344CB8AC3E}">
-        <p14:creationId xmlns:p14="http://schemas.microsoft.com/office/powerpoint/2010/main" val="2077662757"/>
+        <p14:creationId xmlns:p14="http://schemas.microsoft.com/office/powerpoint/2010/main" val="1807624198"/>
       </p:ext>
     </p:extLst>
   </p:cSld>
@@ -5840,7 +6536,7 @@
           <a:p>
             <a:fld id="{F808BE39-9590-4784-9593-CDA6D4690427}" type="datetimeFigureOut">
               <a:rPr lang="en-GB" smtClean="0"/>
-              <a:t>14/05/2025</a:t>
+              <a:t>25/05/2025</a:t>
             </a:fld>
             <a:endParaRPr lang="en-GB"/>
           </a:p>
@@ -5891,7 +6587,7 @@
     </p:spTree>
     <p:extLst>
       <p:ext uri="{BB962C8B-B14F-4D97-AF65-F5344CB8AC3E}">
-        <p14:creationId xmlns:p14="http://schemas.microsoft.com/office/powerpoint/2010/main" val="21085612"/>
+        <p14:creationId xmlns:p14="http://schemas.microsoft.com/office/powerpoint/2010/main" val="3458211351"/>
       </p:ext>
     </p:extLst>
   </p:cSld>
@@ -5930,15 +6626,15 @@
         </p:nvSpPr>
         <p:spPr>
           <a:xfrm>
-            <a:off x="467916" y="533898"/>
-            <a:ext cx="5915025" cy="890820"/>
+            <a:off x="225943" y="1126370"/>
+            <a:ext cx="2856190" cy="1879373"/>
           </a:xfrm>
         </p:spPr>
         <p:txBody>
           <a:bodyPr anchor="b"/>
           <a:lstStyle>
             <a:lvl1pPr>
-              <a:defRPr sz="1874"/>
+              <a:defRPr sz="2173"/>
             </a:lvl1pPr>
           </a:lstStyle>
           <a:p>
@@ -5962,8 +6658,8 @@
         </p:nvSpPr>
         <p:spPr>
           <a:xfrm>
-            <a:off x="467916" y="1433145"/>
-            <a:ext cx="5915025" cy="468461"/>
+            <a:off x="225943" y="3023522"/>
+            <a:ext cx="2856190" cy="988318"/>
           </a:xfrm>
         </p:spPr>
         <p:txBody>
@@ -5971,7 +6667,7 @@
           <a:lstStyle>
             <a:lvl1pPr marL="0" indent="0">
               <a:buNone/>
-              <a:defRPr sz="750">
+              <a:defRPr sz="869">
                 <a:solidFill>
                   <a:schemeClr val="tx1">
                     <a:tint val="82000"/>
@@ -5979,9 +6675,9 @@
                 </a:solidFill>
               </a:defRPr>
             </a:lvl1pPr>
-            <a:lvl2pPr marL="142784" indent="0">
+            <a:lvl2pPr marL="165598" indent="0">
               <a:buNone/>
-              <a:defRPr sz="625">
+              <a:defRPr sz="724">
                 <a:solidFill>
                   <a:schemeClr val="tx1">
                     <a:tint val="82000"/>
@@ -5989,9 +6685,9 @@
                 </a:solidFill>
               </a:defRPr>
             </a:lvl2pPr>
-            <a:lvl3pPr marL="285567" indent="0">
+            <a:lvl3pPr marL="331196" indent="0">
               <a:buNone/>
-              <a:defRPr sz="562">
+              <a:defRPr sz="652">
                 <a:solidFill>
                   <a:schemeClr val="tx1">
                     <a:tint val="82000"/>
@@ -5999,9 +6695,9 @@
                 </a:solidFill>
               </a:defRPr>
             </a:lvl3pPr>
-            <a:lvl4pPr marL="428351" indent="0">
+            <a:lvl4pPr marL="496794" indent="0">
               <a:buNone/>
-              <a:defRPr sz="500">
+              <a:defRPr sz="580">
                 <a:solidFill>
                   <a:schemeClr val="tx1">
                     <a:tint val="82000"/>
@@ -6009,9 +6705,9 @@
                 </a:solidFill>
               </a:defRPr>
             </a:lvl4pPr>
-            <a:lvl5pPr marL="571134" indent="0">
+            <a:lvl5pPr marL="662391" indent="0">
               <a:buNone/>
-              <a:defRPr sz="500">
+              <a:defRPr sz="580">
                 <a:solidFill>
                   <a:schemeClr val="tx1">
                     <a:tint val="82000"/>
@@ -6019,9 +6715,9 @@
                 </a:solidFill>
               </a:defRPr>
             </a:lvl5pPr>
-            <a:lvl6pPr marL="713918" indent="0">
+            <a:lvl6pPr marL="827989" indent="0">
               <a:buNone/>
-              <a:defRPr sz="500">
+              <a:defRPr sz="580">
                 <a:solidFill>
                   <a:schemeClr val="tx1">
                     <a:tint val="82000"/>
@@ -6029,9 +6725,9 @@
                 </a:solidFill>
               </a:defRPr>
             </a:lvl6pPr>
-            <a:lvl7pPr marL="856701" indent="0">
+            <a:lvl7pPr marL="993587" indent="0">
               <a:buNone/>
-              <a:defRPr sz="500">
+              <a:defRPr sz="580">
                 <a:solidFill>
                   <a:schemeClr val="tx1">
                     <a:tint val="82000"/>
@@ -6039,9 +6735,9 @@
                 </a:solidFill>
               </a:defRPr>
             </a:lvl7pPr>
-            <a:lvl8pPr marL="999485" indent="0">
+            <a:lvl8pPr marL="1159185" indent="0">
               <a:buNone/>
-              <a:defRPr sz="500">
+              <a:defRPr sz="580">
                 <a:solidFill>
                   <a:schemeClr val="tx1">
                     <a:tint val="82000"/>
@@ -6049,9 +6745,9 @@
                 </a:solidFill>
               </a:defRPr>
             </a:lvl8pPr>
-            <a:lvl9pPr marL="1142268" indent="0">
+            <a:lvl9pPr marL="1324783" indent="0">
               <a:buNone/>
-              <a:defRPr sz="500">
+              <a:defRPr sz="580">
                 <a:solidFill>
                   <a:schemeClr val="tx1">
                     <a:tint val="82000"/>
@@ -6086,7 +6782,7 @@
           <a:p>
             <a:fld id="{F808BE39-9590-4784-9593-CDA6D4690427}" type="datetimeFigureOut">
               <a:rPr lang="en-GB" smtClean="0"/>
-              <a:t>14/05/2025</a:t>
+              <a:t>25/05/2025</a:t>
             </a:fld>
             <a:endParaRPr lang="en-GB"/>
           </a:p>
@@ -6137,7 +6833,7 @@
     </p:spTree>
     <p:extLst>
       <p:ext uri="{BB962C8B-B14F-4D97-AF65-F5344CB8AC3E}">
-        <p14:creationId xmlns:p14="http://schemas.microsoft.com/office/powerpoint/2010/main" val="2133681165"/>
+        <p14:creationId xmlns:p14="http://schemas.microsoft.com/office/powerpoint/2010/main" val="693308291"/>
       </p:ext>
     </p:extLst>
   </p:cSld>
@@ -6199,8 +6895,8 @@
         </p:nvSpPr>
         <p:spPr>
           <a:xfrm>
-            <a:off x="471488" y="570085"/>
-            <a:ext cx="2914650" cy="1358786"/>
+            <a:off x="227667" y="1202715"/>
+            <a:ext cx="1407398" cy="2866645"/>
           </a:xfrm>
         </p:spPr>
         <p:txBody>
@@ -6256,8 +6952,8 @@
         </p:nvSpPr>
         <p:spPr>
           <a:xfrm>
-            <a:off x="3471863" y="570085"/>
-            <a:ext cx="2914650" cy="1358786"/>
+            <a:off x="1676460" y="1202715"/>
+            <a:ext cx="1407398" cy="2866645"/>
           </a:xfrm>
         </p:spPr>
         <p:txBody>
@@ -6318,7 +7014,7 @@
           <a:p>
             <a:fld id="{F808BE39-9590-4784-9593-CDA6D4690427}" type="datetimeFigureOut">
               <a:rPr lang="en-GB" smtClean="0"/>
-              <a:t>14/05/2025</a:t>
+              <a:t>25/05/2025</a:t>
             </a:fld>
             <a:endParaRPr lang="en-GB"/>
           </a:p>
@@ -6369,7 +7065,7 @@
     </p:spTree>
     <p:extLst>
       <p:ext uri="{BB962C8B-B14F-4D97-AF65-F5344CB8AC3E}">
-        <p14:creationId xmlns:p14="http://schemas.microsoft.com/office/powerpoint/2010/main" val="50857218"/>
+        <p14:creationId xmlns:p14="http://schemas.microsoft.com/office/powerpoint/2010/main" val="712722112"/>
       </p:ext>
     </p:extLst>
   </p:cSld>
@@ -6408,8 +7104,8 @@
         </p:nvSpPr>
         <p:spPr>
           <a:xfrm>
-            <a:off x="472381" y="114017"/>
-            <a:ext cx="5915025" cy="413932"/>
+            <a:off x="228099" y="240544"/>
+            <a:ext cx="2856190" cy="873276"/>
           </a:xfrm>
         </p:spPr>
         <p:txBody>
@@ -6436,8 +7132,8 @@
         </p:nvSpPr>
         <p:spPr>
           <a:xfrm>
-            <a:off x="472381" y="524974"/>
-            <a:ext cx="2901255" cy="257282"/>
+            <a:off x="228099" y="1107544"/>
+            <a:ext cx="1400930" cy="542790"/>
           </a:xfrm>
         </p:spPr>
         <p:txBody>
@@ -6445,39 +7141,39 @@
           <a:lstStyle>
             <a:lvl1pPr marL="0" indent="0">
               <a:buNone/>
-              <a:defRPr sz="750" b="1"/>
+              <a:defRPr sz="869" b="1"/>
             </a:lvl1pPr>
-            <a:lvl2pPr marL="142784" indent="0">
+            <a:lvl2pPr marL="165598" indent="0">
               <a:buNone/>
-              <a:defRPr sz="625" b="1"/>
+              <a:defRPr sz="724" b="1"/>
             </a:lvl2pPr>
-            <a:lvl3pPr marL="285567" indent="0">
+            <a:lvl3pPr marL="331196" indent="0">
               <a:buNone/>
-              <a:defRPr sz="562" b="1"/>
+              <a:defRPr sz="652" b="1"/>
             </a:lvl3pPr>
-            <a:lvl4pPr marL="428351" indent="0">
+            <a:lvl4pPr marL="496794" indent="0">
               <a:buNone/>
-              <a:defRPr sz="500" b="1"/>
+              <a:defRPr sz="580" b="1"/>
             </a:lvl4pPr>
-            <a:lvl5pPr marL="571134" indent="0">
+            <a:lvl5pPr marL="662391" indent="0">
               <a:buNone/>
-              <a:defRPr sz="500" b="1"/>
+              <a:defRPr sz="580" b="1"/>
             </a:lvl5pPr>
-            <a:lvl6pPr marL="713918" indent="0">
+            <a:lvl6pPr marL="827989" indent="0">
               <a:buNone/>
-              <a:defRPr sz="500" b="1"/>
+              <a:defRPr sz="580" b="1"/>
             </a:lvl6pPr>
-            <a:lvl7pPr marL="856701" indent="0">
+            <a:lvl7pPr marL="993587" indent="0">
               <a:buNone/>
-              <a:defRPr sz="500" b="1"/>
+              <a:defRPr sz="580" b="1"/>
             </a:lvl7pPr>
-            <a:lvl8pPr marL="999485" indent="0">
+            <a:lvl8pPr marL="1159185" indent="0">
               <a:buNone/>
-              <a:defRPr sz="500" b="1"/>
+              <a:defRPr sz="580" b="1"/>
             </a:lvl8pPr>
-            <a:lvl9pPr marL="1142268" indent="0">
+            <a:lvl9pPr marL="1324783" indent="0">
               <a:buNone/>
-              <a:defRPr sz="500" b="1"/>
+              <a:defRPr sz="580" b="1"/>
             </a:lvl9pPr>
           </a:lstStyle>
           <a:p>
@@ -6501,8 +7197,8 @@
         </p:nvSpPr>
         <p:spPr>
           <a:xfrm>
-            <a:off x="472381" y="782256"/>
-            <a:ext cx="2901255" cy="1150581"/>
+            <a:off x="228099" y="1650334"/>
+            <a:ext cx="1400930" cy="2427393"/>
           </a:xfrm>
         </p:spPr>
         <p:txBody>
@@ -6558,8 +7254,8 @@
         </p:nvSpPr>
         <p:spPr>
           <a:xfrm>
-            <a:off x="3471863" y="524974"/>
-            <a:ext cx="2915543" cy="257282"/>
+            <a:off x="1676460" y="1107544"/>
+            <a:ext cx="1407829" cy="542790"/>
           </a:xfrm>
         </p:spPr>
         <p:txBody>
@@ -6567,39 +7263,39 @@
           <a:lstStyle>
             <a:lvl1pPr marL="0" indent="0">
               <a:buNone/>
-              <a:defRPr sz="750" b="1"/>
+              <a:defRPr sz="869" b="1"/>
             </a:lvl1pPr>
-            <a:lvl2pPr marL="142784" indent="0">
+            <a:lvl2pPr marL="165598" indent="0">
               <a:buNone/>
-              <a:defRPr sz="625" b="1"/>
+              <a:defRPr sz="724" b="1"/>
             </a:lvl2pPr>
-            <a:lvl3pPr marL="285567" indent="0">
+            <a:lvl3pPr marL="331196" indent="0">
               <a:buNone/>
-              <a:defRPr sz="562" b="1"/>
+              <a:defRPr sz="652" b="1"/>
             </a:lvl3pPr>
-            <a:lvl4pPr marL="428351" indent="0">
+            <a:lvl4pPr marL="496794" indent="0">
               <a:buNone/>
-              <a:defRPr sz="500" b="1"/>
+              <a:defRPr sz="580" b="1"/>
             </a:lvl4pPr>
-            <a:lvl5pPr marL="571134" indent="0">
+            <a:lvl5pPr marL="662391" indent="0">
               <a:buNone/>
-              <a:defRPr sz="500" b="1"/>
+              <a:defRPr sz="580" b="1"/>
             </a:lvl5pPr>
-            <a:lvl6pPr marL="713918" indent="0">
+            <a:lvl6pPr marL="827989" indent="0">
               <a:buNone/>
-              <a:defRPr sz="500" b="1"/>
+              <a:defRPr sz="580" b="1"/>
             </a:lvl6pPr>
-            <a:lvl7pPr marL="856701" indent="0">
+            <a:lvl7pPr marL="993587" indent="0">
               <a:buNone/>
-              <a:defRPr sz="500" b="1"/>
+              <a:defRPr sz="580" b="1"/>
             </a:lvl7pPr>
-            <a:lvl8pPr marL="999485" indent="0">
+            <a:lvl8pPr marL="1159185" indent="0">
               <a:buNone/>
-              <a:defRPr sz="500" b="1"/>
+              <a:defRPr sz="580" b="1"/>
             </a:lvl8pPr>
-            <a:lvl9pPr marL="1142268" indent="0">
+            <a:lvl9pPr marL="1324783" indent="0">
               <a:buNone/>
-              <a:defRPr sz="500" b="1"/>
+              <a:defRPr sz="580" b="1"/>
             </a:lvl9pPr>
           </a:lstStyle>
           <a:p>
@@ -6623,8 +7319,8 @@
         </p:nvSpPr>
         <p:spPr>
           <a:xfrm>
-            <a:off x="3471863" y="782256"/>
-            <a:ext cx="2915543" cy="1150581"/>
+            <a:off x="1676460" y="1650334"/>
+            <a:ext cx="1407829" cy="2427393"/>
           </a:xfrm>
         </p:spPr>
         <p:txBody>
@@ -6685,7 +7381,7 @@
           <a:p>
             <a:fld id="{F808BE39-9590-4784-9593-CDA6D4690427}" type="datetimeFigureOut">
               <a:rPr lang="en-GB" smtClean="0"/>
-              <a:t>14/05/2025</a:t>
+              <a:t>25/05/2025</a:t>
             </a:fld>
             <a:endParaRPr lang="en-GB"/>
           </a:p>
@@ -6736,7 +7432,7 @@
     </p:spTree>
     <p:extLst>
       <p:ext uri="{BB962C8B-B14F-4D97-AF65-F5344CB8AC3E}">
-        <p14:creationId xmlns:p14="http://schemas.microsoft.com/office/powerpoint/2010/main" val="2043514279"/>
+        <p14:creationId xmlns:p14="http://schemas.microsoft.com/office/powerpoint/2010/main" val="3396423807"/>
       </p:ext>
     </p:extLst>
   </p:cSld>
@@ -6803,7 +7499,7 @@
           <a:p>
             <a:fld id="{F808BE39-9590-4784-9593-CDA6D4690427}" type="datetimeFigureOut">
               <a:rPr lang="en-GB" smtClean="0"/>
-              <a:t>14/05/2025</a:t>
+              <a:t>25/05/2025</a:t>
             </a:fld>
             <a:endParaRPr lang="en-GB"/>
           </a:p>
@@ -6854,7 +7550,7 @@
     </p:spTree>
     <p:extLst>
       <p:ext uri="{BB962C8B-B14F-4D97-AF65-F5344CB8AC3E}">
-        <p14:creationId xmlns:p14="http://schemas.microsoft.com/office/powerpoint/2010/main" val="1745345118"/>
+        <p14:creationId xmlns:p14="http://schemas.microsoft.com/office/powerpoint/2010/main" val="3284378633"/>
       </p:ext>
     </p:extLst>
   </p:cSld>
@@ -6898,7 +7594,7 @@
           <a:p>
             <a:fld id="{F808BE39-9590-4784-9593-CDA6D4690427}" type="datetimeFigureOut">
               <a:rPr lang="en-GB" smtClean="0"/>
-              <a:t>14/05/2025</a:t>
+              <a:t>25/05/2025</a:t>
             </a:fld>
             <a:endParaRPr lang="en-GB"/>
           </a:p>
@@ -6949,7 +7645,7 @@
     </p:spTree>
     <p:extLst>
       <p:ext uri="{BB962C8B-B14F-4D97-AF65-F5344CB8AC3E}">
-        <p14:creationId xmlns:p14="http://schemas.microsoft.com/office/powerpoint/2010/main" val="582562709"/>
+        <p14:creationId xmlns:p14="http://schemas.microsoft.com/office/powerpoint/2010/main" val="721892960"/>
       </p:ext>
     </p:extLst>
   </p:cSld>
@@ -6988,15 +7684,15 @@
         </p:nvSpPr>
         <p:spPr>
           <a:xfrm>
-            <a:off x="472381" y="142769"/>
-            <a:ext cx="2211883" cy="499692"/>
+            <a:off x="228099" y="301202"/>
+            <a:ext cx="1068053" cy="1054206"/>
           </a:xfrm>
         </p:spPr>
         <p:txBody>
           <a:bodyPr anchor="b"/>
           <a:lstStyle>
             <a:lvl1pPr>
-              <a:defRPr sz="999"/>
+              <a:defRPr sz="1159"/>
             </a:lvl1pPr>
           </a:lstStyle>
           <a:p>
@@ -7020,39 +7716,39 @@
         </p:nvSpPr>
         <p:spPr>
           <a:xfrm>
-            <a:off x="2915543" y="308342"/>
-            <a:ext cx="3471863" cy="1521880"/>
+            <a:off x="1407829" y="650513"/>
+            <a:ext cx="1676460" cy="3210726"/>
           </a:xfrm>
         </p:spPr>
         <p:txBody>
           <a:bodyPr/>
           <a:lstStyle>
             <a:lvl1pPr>
-              <a:defRPr sz="999"/>
+              <a:defRPr sz="1159"/>
             </a:lvl1pPr>
             <a:lvl2pPr>
-              <a:defRPr sz="874"/>
+              <a:defRPr sz="1014"/>
             </a:lvl2pPr>
             <a:lvl3pPr>
-              <a:defRPr sz="750"/>
+              <a:defRPr sz="869"/>
             </a:lvl3pPr>
             <a:lvl4pPr>
-              <a:defRPr sz="625"/>
+              <a:defRPr sz="724"/>
             </a:lvl4pPr>
             <a:lvl5pPr>
-              <a:defRPr sz="625"/>
+              <a:defRPr sz="724"/>
             </a:lvl5pPr>
             <a:lvl6pPr>
-              <a:defRPr sz="625"/>
+              <a:defRPr sz="724"/>
             </a:lvl6pPr>
             <a:lvl7pPr>
-              <a:defRPr sz="625"/>
+              <a:defRPr sz="724"/>
             </a:lvl7pPr>
             <a:lvl8pPr>
-              <a:defRPr sz="625"/>
+              <a:defRPr sz="724"/>
             </a:lvl8pPr>
             <a:lvl9pPr>
-              <a:defRPr sz="625"/>
+              <a:defRPr sz="724"/>
             </a:lvl9pPr>
           </a:lstStyle>
           <a:p>
@@ -7105,8 +7801,8 @@
         </p:nvSpPr>
         <p:spPr>
           <a:xfrm>
-            <a:off x="472381" y="642462"/>
-            <a:ext cx="2211883" cy="1190239"/>
+            <a:off x="228099" y="1355408"/>
+            <a:ext cx="1068053" cy="2511060"/>
           </a:xfrm>
         </p:spPr>
         <p:txBody>
@@ -7114,39 +7810,39 @@
           <a:lstStyle>
             <a:lvl1pPr marL="0" indent="0">
               <a:buNone/>
-              <a:defRPr sz="500"/>
+              <a:defRPr sz="580"/>
             </a:lvl1pPr>
-            <a:lvl2pPr marL="142784" indent="0">
+            <a:lvl2pPr marL="165598" indent="0">
               <a:buNone/>
-              <a:defRPr sz="437"/>
+              <a:defRPr sz="507"/>
             </a:lvl2pPr>
-            <a:lvl3pPr marL="285567" indent="0">
+            <a:lvl3pPr marL="331196" indent="0">
               <a:buNone/>
-              <a:defRPr sz="375"/>
+              <a:defRPr sz="435"/>
             </a:lvl3pPr>
-            <a:lvl4pPr marL="428351" indent="0">
+            <a:lvl4pPr marL="496794" indent="0">
               <a:buNone/>
-              <a:defRPr sz="312"/>
+              <a:defRPr sz="362"/>
             </a:lvl4pPr>
-            <a:lvl5pPr marL="571134" indent="0">
+            <a:lvl5pPr marL="662391" indent="0">
               <a:buNone/>
-              <a:defRPr sz="312"/>
+              <a:defRPr sz="362"/>
             </a:lvl5pPr>
-            <a:lvl6pPr marL="713918" indent="0">
+            <a:lvl6pPr marL="827989" indent="0">
               <a:buNone/>
-              <a:defRPr sz="312"/>
+              <a:defRPr sz="362"/>
             </a:lvl6pPr>
-            <a:lvl7pPr marL="856701" indent="0">
+            <a:lvl7pPr marL="993587" indent="0">
               <a:buNone/>
-              <a:defRPr sz="312"/>
+              <a:defRPr sz="362"/>
             </a:lvl7pPr>
-            <a:lvl8pPr marL="999485" indent="0">
+            <a:lvl8pPr marL="1159185" indent="0">
               <a:buNone/>
-              <a:defRPr sz="312"/>
+              <a:defRPr sz="362"/>
             </a:lvl8pPr>
-            <a:lvl9pPr marL="1142268" indent="0">
+            <a:lvl9pPr marL="1324783" indent="0">
               <a:buNone/>
-              <a:defRPr sz="312"/>
+              <a:defRPr sz="362"/>
             </a:lvl9pPr>
           </a:lstStyle>
           <a:p>
@@ -7175,7 +7871,7 @@
           <a:p>
             <a:fld id="{F808BE39-9590-4784-9593-CDA6D4690427}" type="datetimeFigureOut">
               <a:rPr lang="en-GB" smtClean="0"/>
-              <a:t>14/05/2025</a:t>
+              <a:t>25/05/2025</a:t>
             </a:fld>
             <a:endParaRPr lang="en-GB"/>
           </a:p>
@@ -7226,7 +7922,7 @@
     </p:spTree>
     <p:extLst>
       <p:ext uri="{BB962C8B-B14F-4D97-AF65-F5344CB8AC3E}">
-        <p14:creationId xmlns:p14="http://schemas.microsoft.com/office/powerpoint/2010/main" val="2813177425"/>
+        <p14:creationId xmlns:p14="http://schemas.microsoft.com/office/powerpoint/2010/main" val="3773366503"/>
       </p:ext>
     </p:extLst>
   </p:cSld>
@@ -7265,15 +7961,15 @@
         </p:nvSpPr>
         <p:spPr>
           <a:xfrm>
-            <a:off x="472381" y="142769"/>
-            <a:ext cx="2211883" cy="499692"/>
+            <a:off x="228099" y="301202"/>
+            <a:ext cx="1068053" cy="1054206"/>
           </a:xfrm>
         </p:spPr>
         <p:txBody>
           <a:bodyPr anchor="b"/>
           <a:lstStyle>
             <a:lvl1pPr>
-              <a:defRPr sz="999"/>
+              <a:defRPr sz="1159"/>
             </a:lvl1pPr>
           </a:lstStyle>
           <a:p>
@@ -7297,8 +7993,8 @@
         </p:nvSpPr>
         <p:spPr>
           <a:xfrm>
-            <a:off x="2915543" y="308342"/>
-            <a:ext cx="3471863" cy="1521880"/>
+            <a:off x="1407829" y="650513"/>
+            <a:ext cx="1676460" cy="3210726"/>
           </a:xfrm>
         </p:spPr>
         <p:txBody>
@@ -7306,39 +8002,39 @@
           <a:lstStyle>
             <a:lvl1pPr marL="0" indent="0">
               <a:buNone/>
-              <a:defRPr sz="999"/>
+              <a:defRPr sz="1159"/>
             </a:lvl1pPr>
-            <a:lvl2pPr marL="142784" indent="0">
+            <a:lvl2pPr marL="165598" indent="0">
               <a:buNone/>
-              <a:defRPr sz="874"/>
+              <a:defRPr sz="1014"/>
             </a:lvl2pPr>
-            <a:lvl3pPr marL="285567" indent="0">
+            <a:lvl3pPr marL="331196" indent="0">
               <a:buNone/>
-              <a:defRPr sz="750"/>
+              <a:defRPr sz="869"/>
             </a:lvl3pPr>
-            <a:lvl4pPr marL="428351" indent="0">
+            <a:lvl4pPr marL="496794" indent="0">
               <a:buNone/>
-              <a:defRPr sz="625"/>
+              <a:defRPr sz="724"/>
             </a:lvl4pPr>
-            <a:lvl5pPr marL="571134" indent="0">
+            <a:lvl5pPr marL="662391" indent="0">
               <a:buNone/>
-              <a:defRPr sz="625"/>
+              <a:defRPr sz="724"/>
             </a:lvl5pPr>
-            <a:lvl6pPr marL="713918" indent="0">
+            <a:lvl6pPr marL="827989" indent="0">
               <a:buNone/>
-              <a:defRPr sz="625"/>
+              <a:defRPr sz="724"/>
             </a:lvl6pPr>
-            <a:lvl7pPr marL="856701" indent="0">
+            <a:lvl7pPr marL="993587" indent="0">
               <a:buNone/>
-              <a:defRPr sz="625"/>
+              <a:defRPr sz="724"/>
             </a:lvl7pPr>
-            <a:lvl8pPr marL="999485" indent="0">
+            <a:lvl8pPr marL="1159185" indent="0">
               <a:buNone/>
-              <a:defRPr sz="625"/>
+              <a:defRPr sz="724"/>
             </a:lvl8pPr>
-            <a:lvl9pPr marL="1142268" indent="0">
+            <a:lvl9pPr marL="1324783" indent="0">
               <a:buNone/>
-              <a:defRPr sz="625"/>
+              <a:defRPr sz="724"/>
             </a:lvl9pPr>
           </a:lstStyle>
           <a:p>
@@ -7362,8 +8058,8 @@
         </p:nvSpPr>
         <p:spPr>
           <a:xfrm>
-            <a:off x="472381" y="642462"/>
-            <a:ext cx="2211883" cy="1190239"/>
+            <a:off x="228099" y="1355408"/>
+            <a:ext cx="1068053" cy="2511060"/>
           </a:xfrm>
         </p:spPr>
         <p:txBody>
@@ -7371,39 +8067,39 @@
           <a:lstStyle>
             <a:lvl1pPr marL="0" indent="0">
               <a:buNone/>
-              <a:defRPr sz="500"/>
+              <a:defRPr sz="580"/>
             </a:lvl1pPr>
-            <a:lvl2pPr marL="142784" indent="0">
+            <a:lvl2pPr marL="165598" indent="0">
               <a:buNone/>
-              <a:defRPr sz="437"/>
+              <a:defRPr sz="507"/>
             </a:lvl2pPr>
-            <a:lvl3pPr marL="285567" indent="0">
+            <a:lvl3pPr marL="331196" indent="0">
               <a:buNone/>
-              <a:defRPr sz="375"/>
+              <a:defRPr sz="435"/>
             </a:lvl3pPr>
-            <a:lvl4pPr marL="428351" indent="0">
+            <a:lvl4pPr marL="496794" indent="0">
               <a:buNone/>
-              <a:defRPr sz="312"/>
+              <a:defRPr sz="362"/>
             </a:lvl4pPr>
-            <a:lvl5pPr marL="571134" indent="0">
+            <a:lvl5pPr marL="662391" indent="0">
               <a:buNone/>
-              <a:defRPr sz="312"/>
+              <a:defRPr sz="362"/>
             </a:lvl5pPr>
-            <a:lvl6pPr marL="713918" indent="0">
+            <a:lvl6pPr marL="827989" indent="0">
               <a:buNone/>
-              <a:defRPr sz="312"/>
+              <a:defRPr sz="362"/>
             </a:lvl6pPr>
-            <a:lvl7pPr marL="856701" indent="0">
+            <a:lvl7pPr marL="993587" indent="0">
               <a:buNone/>
-              <a:defRPr sz="312"/>
+              <a:defRPr sz="362"/>
             </a:lvl7pPr>
-            <a:lvl8pPr marL="999485" indent="0">
+            <a:lvl8pPr marL="1159185" indent="0">
               <a:buNone/>
-              <a:defRPr sz="312"/>
+              <a:defRPr sz="362"/>
             </a:lvl8pPr>
-            <a:lvl9pPr marL="1142268" indent="0">
+            <a:lvl9pPr marL="1324783" indent="0">
               <a:buNone/>
-              <a:defRPr sz="312"/>
+              <a:defRPr sz="362"/>
             </a:lvl9pPr>
           </a:lstStyle>
           <a:p>
@@ -7432,7 +8128,7 @@
           <a:p>
             <a:fld id="{F808BE39-9590-4784-9593-CDA6D4690427}" type="datetimeFigureOut">
               <a:rPr lang="en-GB" smtClean="0"/>
-              <a:t>14/05/2025</a:t>
+              <a:t>25/05/2025</a:t>
             </a:fld>
             <a:endParaRPr lang="en-GB"/>
           </a:p>
@@ -7483,7 +8179,7 @@
     </p:spTree>
     <p:extLst>
       <p:ext uri="{BB962C8B-B14F-4D97-AF65-F5344CB8AC3E}">
-        <p14:creationId xmlns:p14="http://schemas.microsoft.com/office/powerpoint/2010/main" val="3062838846"/>
+        <p14:creationId xmlns:p14="http://schemas.microsoft.com/office/powerpoint/2010/main" val="3801901257"/>
       </p:ext>
     </p:extLst>
   </p:cSld>
@@ -7527,8 +8223,8 @@
         </p:nvSpPr>
         <p:spPr>
           <a:xfrm>
-            <a:off x="471488" y="114017"/>
-            <a:ext cx="5915025" cy="413932"/>
+            <a:off x="227668" y="240544"/>
+            <a:ext cx="2856190" cy="873276"/>
           </a:xfrm>
           <a:prstGeom prst="rect">
             <a:avLst/>
@@ -7560,8 +8256,8 @@
         </p:nvSpPr>
         <p:spPr>
           <a:xfrm>
-            <a:off x="471488" y="570085"/>
-            <a:ext cx="5915025" cy="1358786"/>
+            <a:off x="227668" y="1202715"/>
+            <a:ext cx="2856190" cy="2866645"/>
           </a:xfrm>
           <a:prstGeom prst="rect">
             <a:avLst/>
@@ -7622,8 +8318,8 @@
         </p:nvSpPr>
         <p:spPr>
           <a:xfrm>
-            <a:off x="471488" y="1984889"/>
-            <a:ext cx="1543050" cy="114017"/>
+            <a:off x="227667" y="4187541"/>
+            <a:ext cx="745093" cy="240543"/>
           </a:xfrm>
           <a:prstGeom prst="rect">
             <a:avLst/>
@@ -7633,7 +8329,7 @@
           <a:bodyPr vert="horz" lIns="91440" tIns="45720" rIns="91440" bIns="45720" rtlCol="0" anchor="ctr"/>
           <a:lstStyle>
             <a:lvl1pPr algn="l">
-              <a:defRPr sz="375">
+              <a:defRPr sz="435">
                 <a:solidFill>
                   <a:schemeClr val="tx1">
                     <a:tint val="82000"/>
@@ -7645,7 +8341,7 @@
           <a:p>
             <a:fld id="{F808BE39-9590-4784-9593-CDA6D4690427}" type="datetimeFigureOut">
               <a:rPr lang="en-GB" smtClean="0"/>
-              <a:t>14/05/2025</a:t>
+              <a:t>25/05/2025</a:t>
             </a:fld>
             <a:endParaRPr lang="en-GB"/>
           </a:p>
@@ -7663,8 +8359,8 @@
         </p:nvSpPr>
         <p:spPr>
           <a:xfrm>
-            <a:off x="2271713" y="1984889"/>
-            <a:ext cx="2314575" cy="114017"/>
+            <a:off x="1096943" y="4187541"/>
+            <a:ext cx="1117640" cy="240543"/>
           </a:xfrm>
           <a:prstGeom prst="rect">
             <a:avLst/>
@@ -7674,7 +8370,7 @@
           <a:bodyPr vert="horz" lIns="91440" tIns="45720" rIns="91440" bIns="45720" rtlCol="0" anchor="ctr"/>
           <a:lstStyle>
             <a:lvl1pPr algn="ctr">
-              <a:defRPr sz="375">
+              <a:defRPr sz="435">
                 <a:solidFill>
                   <a:schemeClr val="tx1">
                     <a:tint val="82000"/>
@@ -7700,8 +8396,8 @@
         </p:nvSpPr>
         <p:spPr>
           <a:xfrm>
-            <a:off x="4843463" y="1984889"/>
-            <a:ext cx="1543050" cy="114017"/>
+            <a:off x="2338765" y="4187541"/>
+            <a:ext cx="745093" cy="240543"/>
           </a:xfrm>
           <a:prstGeom prst="rect">
             <a:avLst/>
@@ -7711,7 +8407,7 @@
           <a:bodyPr vert="horz" lIns="91440" tIns="45720" rIns="91440" bIns="45720" rtlCol="0" anchor="ctr"/>
           <a:lstStyle>
             <a:lvl1pPr algn="r">
-              <a:defRPr sz="375">
+              <a:defRPr sz="435">
                 <a:solidFill>
                   <a:schemeClr val="tx1">
                     <a:tint val="82000"/>
@@ -7732,27 +8428,27 @@
     </p:spTree>
     <p:extLst>
       <p:ext uri="{BB962C8B-B14F-4D97-AF65-F5344CB8AC3E}">
-        <p14:creationId xmlns:p14="http://schemas.microsoft.com/office/powerpoint/2010/main" val="3101751184"/>
+        <p14:creationId xmlns:p14="http://schemas.microsoft.com/office/powerpoint/2010/main" val="1603255266"/>
       </p:ext>
     </p:extLst>
   </p:cSld>
   <p:clrMap bg1="lt1" tx1="dk1" bg2="lt2" tx2="dk2" accent1="accent1" accent2="accent2" accent3="accent3" accent4="accent4" accent5="accent5" accent6="accent6" hlink="hlink" folHlink="folHlink"/>
   <p:sldLayoutIdLst>
-    <p:sldLayoutId id="2147483793" r:id="rId1"/>
-    <p:sldLayoutId id="2147483794" r:id="rId2"/>
-    <p:sldLayoutId id="2147483795" r:id="rId3"/>
-    <p:sldLayoutId id="2147483796" r:id="rId4"/>
-    <p:sldLayoutId id="2147483797" r:id="rId5"/>
-    <p:sldLayoutId id="2147483798" r:id="rId6"/>
-    <p:sldLayoutId id="2147483799" r:id="rId7"/>
-    <p:sldLayoutId id="2147483800" r:id="rId8"/>
-    <p:sldLayoutId id="2147483801" r:id="rId9"/>
-    <p:sldLayoutId id="2147483802" r:id="rId10"/>
-    <p:sldLayoutId id="2147483803" r:id="rId11"/>
+    <p:sldLayoutId id="2147483817" r:id="rId1"/>
+    <p:sldLayoutId id="2147483818" r:id="rId2"/>
+    <p:sldLayoutId id="2147483819" r:id="rId3"/>
+    <p:sldLayoutId id="2147483820" r:id="rId4"/>
+    <p:sldLayoutId id="2147483821" r:id="rId5"/>
+    <p:sldLayoutId id="2147483822" r:id="rId6"/>
+    <p:sldLayoutId id="2147483823" r:id="rId7"/>
+    <p:sldLayoutId id="2147483824" r:id="rId8"/>
+    <p:sldLayoutId id="2147483825" r:id="rId9"/>
+    <p:sldLayoutId id="2147483826" r:id="rId10"/>
+    <p:sldLayoutId id="2147483827" r:id="rId11"/>
   </p:sldLayoutIdLst>
   <p:txStyles>
     <p:titleStyle>
-      <a:lvl1pPr algn="l" defTabSz="285567" rtl="0" eaLnBrk="1" latinLnBrk="0" hangingPunct="1">
+      <a:lvl1pPr algn="l" defTabSz="331196" rtl="0" eaLnBrk="1" latinLnBrk="0" hangingPunct="1">
         <a:lnSpc>
           <a:spcPct val="90000"/>
         </a:lnSpc>
@@ -7760,7 +8456,7 @@
           <a:spcPct val="0"/>
         </a:spcBef>
         <a:buNone/>
-        <a:defRPr sz="1374" kern="1200">
+        <a:defRPr sz="1594" kern="1200">
           <a:solidFill>
             <a:schemeClr val="tx1"/>
           </a:solidFill>
@@ -7771,16 +8467,16 @@
       </a:lvl1pPr>
     </p:titleStyle>
     <p:bodyStyle>
-      <a:lvl1pPr marL="71392" indent="-71392" algn="l" defTabSz="285567" rtl="0" eaLnBrk="1" latinLnBrk="0" hangingPunct="1">
+      <a:lvl1pPr marL="82799" indent="-82799" algn="l" defTabSz="331196" rtl="0" eaLnBrk="1" latinLnBrk="0" hangingPunct="1">
         <a:lnSpc>
           <a:spcPct val="90000"/>
         </a:lnSpc>
         <a:spcBef>
-          <a:spcPts val="312"/>
+          <a:spcPts val="362"/>
         </a:spcBef>
         <a:buFont typeface="Arial" panose="020B0604020202020204" pitchFamily="34" charset="0"/>
         <a:buChar char="•"/>
-        <a:defRPr sz="874" kern="1200">
+        <a:defRPr sz="1014" kern="1200">
           <a:solidFill>
             <a:schemeClr val="tx1"/>
           </a:solidFill>
@@ -7789,16 +8485,16 @@
           <a:cs typeface="+mn-cs"/>
         </a:defRPr>
       </a:lvl1pPr>
-      <a:lvl2pPr marL="214175" indent="-71392" algn="l" defTabSz="285567" rtl="0" eaLnBrk="1" latinLnBrk="0" hangingPunct="1">
+      <a:lvl2pPr marL="248397" indent="-82799" algn="l" defTabSz="331196" rtl="0" eaLnBrk="1" latinLnBrk="0" hangingPunct="1">
         <a:lnSpc>
           <a:spcPct val="90000"/>
         </a:lnSpc>
         <a:spcBef>
-          <a:spcPts val="156"/>
+          <a:spcPts val="181"/>
         </a:spcBef>
         <a:buFont typeface="Arial" panose="020B0604020202020204" pitchFamily="34" charset="0"/>
         <a:buChar char="•"/>
-        <a:defRPr sz="750" kern="1200">
+        <a:defRPr sz="869" kern="1200">
           <a:solidFill>
             <a:schemeClr val="tx1"/>
           </a:solidFill>
@@ -7807,16 +8503,16 @@
           <a:cs typeface="+mn-cs"/>
         </a:defRPr>
       </a:lvl2pPr>
-      <a:lvl3pPr marL="356959" indent="-71392" algn="l" defTabSz="285567" rtl="0" eaLnBrk="1" latinLnBrk="0" hangingPunct="1">
+      <a:lvl3pPr marL="413995" indent="-82799" algn="l" defTabSz="331196" rtl="0" eaLnBrk="1" latinLnBrk="0" hangingPunct="1">
         <a:lnSpc>
           <a:spcPct val="90000"/>
         </a:lnSpc>
         <a:spcBef>
-          <a:spcPts val="156"/>
+          <a:spcPts val="181"/>
         </a:spcBef>
         <a:buFont typeface="Arial" panose="020B0604020202020204" pitchFamily="34" charset="0"/>
         <a:buChar char="•"/>
-        <a:defRPr sz="625" kern="1200">
+        <a:defRPr sz="724" kern="1200">
           <a:solidFill>
             <a:schemeClr val="tx1"/>
           </a:solidFill>
@@ -7825,16 +8521,16 @@
           <a:cs typeface="+mn-cs"/>
         </a:defRPr>
       </a:lvl3pPr>
-      <a:lvl4pPr marL="499742" indent="-71392" algn="l" defTabSz="285567" rtl="0" eaLnBrk="1" latinLnBrk="0" hangingPunct="1">
+      <a:lvl4pPr marL="579592" indent="-82799" algn="l" defTabSz="331196" rtl="0" eaLnBrk="1" latinLnBrk="0" hangingPunct="1">
         <a:lnSpc>
           <a:spcPct val="90000"/>
         </a:lnSpc>
         <a:spcBef>
-          <a:spcPts val="156"/>
+          <a:spcPts val="181"/>
         </a:spcBef>
         <a:buFont typeface="Arial" panose="020B0604020202020204" pitchFamily="34" charset="0"/>
         <a:buChar char="•"/>
-        <a:defRPr sz="562" kern="1200">
+        <a:defRPr sz="652" kern="1200">
           <a:solidFill>
             <a:schemeClr val="tx1"/>
           </a:solidFill>
@@ -7843,16 +8539,16 @@
           <a:cs typeface="+mn-cs"/>
         </a:defRPr>
       </a:lvl4pPr>
-      <a:lvl5pPr marL="642526" indent="-71392" algn="l" defTabSz="285567" rtl="0" eaLnBrk="1" latinLnBrk="0" hangingPunct="1">
+      <a:lvl5pPr marL="745190" indent="-82799" algn="l" defTabSz="331196" rtl="0" eaLnBrk="1" latinLnBrk="0" hangingPunct="1">
         <a:lnSpc>
           <a:spcPct val="90000"/>
         </a:lnSpc>
         <a:spcBef>
-          <a:spcPts val="156"/>
+          <a:spcPts val="181"/>
         </a:spcBef>
         <a:buFont typeface="Arial" panose="020B0604020202020204" pitchFamily="34" charset="0"/>
         <a:buChar char="•"/>
-        <a:defRPr sz="562" kern="1200">
+        <a:defRPr sz="652" kern="1200">
           <a:solidFill>
             <a:schemeClr val="tx1"/>
           </a:solidFill>
@@ -7861,16 +8557,16 @@
           <a:cs typeface="+mn-cs"/>
         </a:defRPr>
       </a:lvl5pPr>
-      <a:lvl6pPr marL="785310" indent="-71392" algn="l" defTabSz="285567" rtl="0" eaLnBrk="1" latinLnBrk="0" hangingPunct="1">
+      <a:lvl6pPr marL="910788" indent="-82799" algn="l" defTabSz="331196" rtl="0" eaLnBrk="1" latinLnBrk="0" hangingPunct="1">
         <a:lnSpc>
           <a:spcPct val="90000"/>
         </a:lnSpc>
         <a:spcBef>
-          <a:spcPts val="156"/>
+          <a:spcPts val="181"/>
         </a:spcBef>
         <a:buFont typeface="Arial" panose="020B0604020202020204" pitchFamily="34" charset="0"/>
         <a:buChar char="•"/>
-        <a:defRPr sz="562" kern="1200">
+        <a:defRPr sz="652" kern="1200">
           <a:solidFill>
             <a:schemeClr val="tx1"/>
           </a:solidFill>
@@ -7879,16 +8575,16 @@
           <a:cs typeface="+mn-cs"/>
         </a:defRPr>
       </a:lvl6pPr>
-      <a:lvl7pPr marL="928093" indent="-71392" algn="l" defTabSz="285567" rtl="0" eaLnBrk="1" latinLnBrk="0" hangingPunct="1">
+      <a:lvl7pPr marL="1076386" indent="-82799" algn="l" defTabSz="331196" rtl="0" eaLnBrk="1" latinLnBrk="0" hangingPunct="1">
         <a:lnSpc>
           <a:spcPct val="90000"/>
         </a:lnSpc>
         <a:spcBef>
-          <a:spcPts val="156"/>
+          <a:spcPts val="181"/>
         </a:spcBef>
         <a:buFont typeface="Arial" panose="020B0604020202020204" pitchFamily="34" charset="0"/>
         <a:buChar char="•"/>
-        <a:defRPr sz="562" kern="1200">
+        <a:defRPr sz="652" kern="1200">
           <a:solidFill>
             <a:schemeClr val="tx1"/>
           </a:solidFill>
@@ -7897,16 +8593,16 @@
           <a:cs typeface="+mn-cs"/>
         </a:defRPr>
       </a:lvl7pPr>
-      <a:lvl8pPr marL="1070877" indent="-71392" algn="l" defTabSz="285567" rtl="0" eaLnBrk="1" latinLnBrk="0" hangingPunct="1">
+      <a:lvl8pPr marL="1241984" indent="-82799" algn="l" defTabSz="331196" rtl="0" eaLnBrk="1" latinLnBrk="0" hangingPunct="1">
         <a:lnSpc>
           <a:spcPct val="90000"/>
         </a:lnSpc>
         <a:spcBef>
-          <a:spcPts val="156"/>
+          <a:spcPts val="181"/>
         </a:spcBef>
         <a:buFont typeface="Arial" panose="020B0604020202020204" pitchFamily="34" charset="0"/>
         <a:buChar char="•"/>
-        <a:defRPr sz="562" kern="1200">
+        <a:defRPr sz="652" kern="1200">
           <a:solidFill>
             <a:schemeClr val="tx1"/>
           </a:solidFill>
@@ -7915,16 +8611,16 @@
           <a:cs typeface="+mn-cs"/>
         </a:defRPr>
       </a:lvl8pPr>
-      <a:lvl9pPr marL="1213660" indent="-71392" algn="l" defTabSz="285567" rtl="0" eaLnBrk="1" latinLnBrk="0" hangingPunct="1">
+      <a:lvl9pPr marL="1407582" indent="-82799" algn="l" defTabSz="331196" rtl="0" eaLnBrk="1" latinLnBrk="0" hangingPunct="1">
         <a:lnSpc>
           <a:spcPct val="90000"/>
         </a:lnSpc>
         <a:spcBef>
-          <a:spcPts val="156"/>
+          <a:spcPts val="181"/>
         </a:spcBef>
         <a:buFont typeface="Arial" panose="020B0604020202020204" pitchFamily="34" charset="0"/>
         <a:buChar char="•"/>
-        <a:defRPr sz="562" kern="1200">
+        <a:defRPr sz="652" kern="1200">
           <a:solidFill>
             <a:schemeClr val="tx1"/>
           </a:solidFill>
@@ -7938,8 +8634,8 @@
       <a:defPPr>
         <a:defRPr lang="en-US"/>
       </a:defPPr>
-      <a:lvl1pPr marL="0" algn="l" defTabSz="285567" rtl="0" eaLnBrk="1" latinLnBrk="0" hangingPunct="1">
-        <a:defRPr sz="562" kern="1200">
+      <a:lvl1pPr marL="0" algn="l" defTabSz="331196" rtl="0" eaLnBrk="1" latinLnBrk="0" hangingPunct="1">
+        <a:defRPr sz="652" kern="1200">
           <a:solidFill>
             <a:schemeClr val="tx1"/>
           </a:solidFill>
@@ -7948,8 +8644,8 @@
           <a:cs typeface="+mn-cs"/>
         </a:defRPr>
       </a:lvl1pPr>
-      <a:lvl2pPr marL="142784" algn="l" defTabSz="285567" rtl="0" eaLnBrk="1" latinLnBrk="0" hangingPunct="1">
-        <a:defRPr sz="562" kern="1200">
+      <a:lvl2pPr marL="165598" algn="l" defTabSz="331196" rtl="0" eaLnBrk="1" latinLnBrk="0" hangingPunct="1">
+        <a:defRPr sz="652" kern="1200">
           <a:solidFill>
             <a:schemeClr val="tx1"/>
           </a:solidFill>
@@ -7958,8 +8654,8 @@
           <a:cs typeface="+mn-cs"/>
         </a:defRPr>
       </a:lvl2pPr>
-      <a:lvl3pPr marL="285567" algn="l" defTabSz="285567" rtl="0" eaLnBrk="1" latinLnBrk="0" hangingPunct="1">
-        <a:defRPr sz="562" kern="1200">
+      <a:lvl3pPr marL="331196" algn="l" defTabSz="331196" rtl="0" eaLnBrk="1" latinLnBrk="0" hangingPunct="1">
+        <a:defRPr sz="652" kern="1200">
           <a:solidFill>
             <a:schemeClr val="tx1"/>
           </a:solidFill>
@@ -7968,8 +8664,8 @@
           <a:cs typeface="+mn-cs"/>
         </a:defRPr>
       </a:lvl3pPr>
-      <a:lvl4pPr marL="428351" algn="l" defTabSz="285567" rtl="0" eaLnBrk="1" latinLnBrk="0" hangingPunct="1">
-        <a:defRPr sz="562" kern="1200">
+      <a:lvl4pPr marL="496794" algn="l" defTabSz="331196" rtl="0" eaLnBrk="1" latinLnBrk="0" hangingPunct="1">
+        <a:defRPr sz="652" kern="1200">
           <a:solidFill>
             <a:schemeClr val="tx1"/>
           </a:solidFill>
@@ -7978,8 +8674,8 @@
           <a:cs typeface="+mn-cs"/>
         </a:defRPr>
       </a:lvl4pPr>
-      <a:lvl5pPr marL="571134" algn="l" defTabSz="285567" rtl="0" eaLnBrk="1" latinLnBrk="0" hangingPunct="1">
-        <a:defRPr sz="562" kern="1200">
+      <a:lvl5pPr marL="662391" algn="l" defTabSz="331196" rtl="0" eaLnBrk="1" latinLnBrk="0" hangingPunct="1">
+        <a:defRPr sz="652" kern="1200">
           <a:solidFill>
             <a:schemeClr val="tx1"/>
           </a:solidFill>
@@ -7988,8 +8684,8 @@
           <a:cs typeface="+mn-cs"/>
         </a:defRPr>
       </a:lvl5pPr>
-      <a:lvl6pPr marL="713918" algn="l" defTabSz="285567" rtl="0" eaLnBrk="1" latinLnBrk="0" hangingPunct="1">
-        <a:defRPr sz="562" kern="1200">
+      <a:lvl6pPr marL="827989" algn="l" defTabSz="331196" rtl="0" eaLnBrk="1" latinLnBrk="0" hangingPunct="1">
+        <a:defRPr sz="652" kern="1200">
           <a:solidFill>
             <a:schemeClr val="tx1"/>
           </a:solidFill>
@@ -7998,8 +8694,8 @@
           <a:cs typeface="+mn-cs"/>
         </a:defRPr>
       </a:lvl6pPr>
-      <a:lvl7pPr marL="856701" algn="l" defTabSz="285567" rtl="0" eaLnBrk="1" latinLnBrk="0" hangingPunct="1">
-        <a:defRPr sz="562" kern="1200">
+      <a:lvl7pPr marL="993587" algn="l" defTabSz="331196" rtl="0" eaLnBrk="1" latinLnBrk="0" hangingPunct="1">
+        <a:defRPr sz="652" kern="1200">
           <a:solidFill>
             <a:schemeClr val="tx1"/>
           </a:solidFill>
@@ -8008,8 +8704,8 @@
           <a:cs typeface="+mn-cs"/>
         </a:defRPr>
       </a:lvl7pPr>
-      <a:lvl8pPr marL="999485" algn="l" defTabSz="285567" rtl="0" eaLnBrk="1" latinLnBrk="0" hangingPunct="1">
-        <a:defRPr sz="562" kern="1200">
+      <a:lvl8pPr marL="1159185" algn="l" defTabSz="331196" rtl="0" eaLnBrk="1" latinLnBrk="0" hangingPunct="1">
+        <a:defRPr sz="652" kern="1200">
           <a:solidFill>
             <a:schemeClr val="tx1"/>
           </a:solidFill>
@@ -8018,8 +8714,8 @@
           <a:cs typeface="+mn-cs"/>
         </a:defRPr>
       </a:lvl8pPr>
-      <a:lvl9pPr marL="1142268" algn="l" defTabSz="285567" rtl="0" eaLnBrk="1" latinLnBrk="0" hangingPunct="1">
-        <a:defRPr sz="562" kern="1200">
+      <a:lvl9pPr marL="1324783" algn="l" defTabSz="331196" rtl="0" eaLnBrk="1" latinLnBrk="0" hangingPunct="1">
+        <a:defRPr sz="652" kern="1200">
           <a:solidFill>
             <a:schemeClr val="tx1"/>
           </a:solidFill>
@@ -8052,7 +8748,7 @@
       </p:grpSpPr>
       <p:pic>
         <p:nvPicPr>
-          <p:cNvPr id="3" name="Picture 220" descr="A map of the united states&#10;&#10;Description automatically generated">
+          <p:cNvPr id="89" name="Picture 220" descr="A map of the united states&#10;&#10;Description automatically generated">
             <a:extLst>
               <a:ext uri="{FF2B5EF4-FFF2-40B4-BE49-F238E27FC236}">
                 <a16:creationId xmlns:a16="http://schemas.microsoft.com/office/drawing/2014/main" id="{D26D42B5-73FE-CAB1-1164-A632119A173E}"/>
@@ -8077,7 +8773,7 @@
         </p:blipFill>
         <p:spPr>
           <a:xfrm>
-            <a:off x="3944963" y="422494"/>
+            <a:off x="338405" y="2746927"/>
             <a:ext cx="2884447" cy="1577838"/>
           </a:xfrm>
           <a:prstGeom prst="rect">
@@ -8094,7 +8790,7 @@
       </p:pic>
       <p:pic>
         <p:nvPicPr>
-          <p:cNvPr id="4" name="Picture 221" descr="A map of the united states&#10;&#10;Description automatically generated">
+          <p:cNvPr id="90" name="Picture 221" descr="A map of the united states&#10;&#10;Description automatically generated">
             <a:extLst>
               <a:ext uri="{FF2B5EF4-FFF2-40B4-BE49-F238E27FC236}">
                 <a16:creationId xmlns:a16="http://schemas.microsoft.com/office/drawing/2014/main" id="{E9C6D329-88F6-78AE-5643-50A8169BD267}"/>
@@ -8119,7 +8815,7 @@
         </p:blipFill>
         <p:spPr>
           <a:xfrm>
-            <a:off x="3983186" y="282385"/>
+            <a:off x="376628" y="2606818"/>
             <a:ext cx="2808000" cy="87881"/>
           </a:xfrm>
           <a:prstGeom prst="rect">
@@ -8129,7 +8825,7 @@
       </p:pic>
       <p:sp>
         <p:nvSpPr>
-          <p:cNvPr id="5" name="TextBox 222">
+          <p:cNvPr id="91" name="TextBox 222">
             <a:extLst>
               <a:ext uri="{FF2B5EF4-FFF2-40B4-BE49-F238E27FC236}">
                 <a16:creationId xmlns:a16="http://schemas.microsoft.com/office/drawing/2014/main" id="{0C7866F8-3D28-D23F-94F4-31434FC45C8D}"/>
@@ -8141,7 +8837,7 @@
         </p:nvSpPr>
         <p:spPr>
           <a:xfrm>
-            <a:off x="-202100" y="422493"/>
+            <a:off x="-148995" y="455149"/>
             <a:ext cx="536815" cy="215444"/>
           </a:xfrm>
           <a:prstGeom prst="rect">
@@ -8191,7 +8887,7 @@
       </p:sp>
       <p:sp>
         <p:nvSpPr>
-          <p:cNvPr id="6" name="TextBox 223">
+          <p:cNvPr id="92" name="TextBox 223">
             <a:extLst>
               <a:ext uri="{FF2B5EF4-FFF2-40B4-BE49-F238E27FC236}">
                 <a16:creationId xmlns:a16="http://schemas.microsoft.com/office/drawing/2014/main" id="{12F23E37-D850-2205-D764-E65B9EEE2D3F}"/>
@@ -8203,7 +8899,7 @@
         </p:nvSpPr>
         <p:spPr>
           <a:xfrm>
-            <a:off x="-202100" y="1020502"/>
+            <a:off x="-148995" y="1053158"/>
             <a:ext cx="536815" cy="215444"/>
           </a:xfrm>
           <a:prstGeom prst="rect">
@@ -8253,7 +8949,7 @@
       </p:sp>
       <p:sp>
         <p:nvSpPr>
-          <p:cNvPr id="7" name="TextBox 224">
+          <p:cNvPr id="93" name="TextBox 224">
             <a:extLst>
               <a:ext uri="{FF2B5EF4-FFF2-40B4-BE49-F238E27FC236}">
                 <a16:creationId xmlns:a16="http://schemas.microsoft.com/office/drawing/2014/main" id="{47E1CCA9-1FE1-AC39-2A65-B2530877FE67}"/>
@@ -8265,7 +8961,7 @@
         </p:nvSpPr>
         <p:spPr>
           <a:xfrm>
-            <a:off x="-202100" y="1534712"/>
+            <a:off x="-148995" y="1567368"/>
             <a:ext cx="536815" cy="215444"/>
           </a:xfrm>
           <a:prstGeom prst="rect">
@@ -8315,7 +9011,7 @@
       </p:sp>
       <p:sp>
         <p:nvSpPr>
-          <p:cNvPr id="8" name="TextBox 225">
+          <p:cNvPr id="94" name="TextBox 225">
             <a:extLst>
               <a:ext uri="{FF2B5EF4-FFF2-40B4-BE49-F238E27FC236}">
                 <a16:creationId xmlns:a16="http://schemas.microsoft.com/office/drawing/2014/main" id="{1BF944C8-72B7-EE1A-6F7B-CF42B3774EC5}"/>
@@ -8327,7 +9023,7 @@
         </p:nvSpPr>
         <p:spPr>
           <a:xfrm>
-            <a:off x="422180" y="1972622"/>
+            <a:off x="475285" y="2005278"/>
             <a:ext cx="536815" cy="215444"/>
           </a:xfrm>
           <a:prstGeom prst="rect">
@@ -8377,7 +9073,7 @@
       </p:sp>
       <p:sp>
         <p:nvSpPr>
-          <p:cNvPr id="9" name="TextBox 226">
+          <p:cNvPr id="95" name="TextBox 226">
             <a:extLst>
               <a:ext uri="{FF2B5EF4-FFF2-40B4-BE49-F238E27FC236}">
                 <a16:creationId xmlns:a16="http://schemas.microsoft.com/office/drawing/2014/main" id="{E426F851-70D0-C74A-EE11-AF956E60CFE7}"/>
@@ -8389,7 +9085,7 @@
         </p:nvSpPr>
         <p:spPr>
           <a:xfrm>
-            <a:off x="1258814" y="1972622"/>
+            <a:off x="1311919" y="2005278"/>
             <a:ext cx="536815" cy="215444"/>
           </a:xfrm>
           <a:prstGeom prst="rect">
@@ -8439,7 +9135,7 @@
       </p:sp>
       <p:sp>
         <p:nvSpPr>
-          <p:cNvPr id="10" name="TextBox 227">
+          <p:cNvPr id="96" name="TextBox 227">
             <a:extLst>
               <a:ext uri="{FF2B5EF4-FFF2-40B4-BE49-F238E27FC236}">
                 <a16:creationId xmlns:a16="http://schemas.microsoft.com/office/drawing/2014/main" id="{27EB65F3-73F5-B07A-A818-9796C53071D9}"/>
@@ -8451,7 +9147,7 @@
         </p:nvSpPr>
         <p:spPr>
           <a:xfrm>
-            <a:off x="2095448" y="1972622"/>
+            <a:off x="2148553" y="2005278"/>
             <a:ext cx="536815" cy="215444"/>
           </a:xfrm>
           <a:prstGeom prst="rect">
@@ -8501,7 +9197,7 @@
       </p:sp>
       <p:sp>
         <p:nvSpPr>
-          <p:cNvPr id="11" name="TextBox 228">
+          <p:cNvPr id="97" name="TextBox 228">
             <a:extLst>
               <a:ext uri="{FF2B5EF4-FFF2-40B4-BE49-F238E27FC236}">
                 <a16:creationId xmlns:a16="http://schemas.microsoft.com/office/drawing/2014/main" id="{F8E8BF63-273E-0C12-2314-78FB9D7EA77C}"/>
@@ -8513,7 +9209,7 @@
         </p:nvSpPr>
         <p:spPr>
           <a:xfrm>
-            <a:off x="6575469" y="102915"/>
+            <a:off x="2968911" y="2427348"/>
             <a:ext cx="354154" cy="215444"/>
           </a:xfrm>
           <a:prstGeom prst="rect">
@@ -8543,7 +9239,7 @@
       </p:sp>
       <p:sp>
         <p:nvSpPr>
-          <p:cNvPr id="12" name="TextBox 229">
+          <p:cNvPr id="98" name="TextBox 229">
             <a:extLst>
               <a:ext uri="{FF2B5EF4-FFF2-40B4-BE49-F238E27FC236}">
                 <a16:creationId xmlns:a16="http://schemas.microsoft.com/office/drawing/2014/main" id="{31D547D6-3E3A-6367-A806-E3B56F1B5A30}"/>
@@ -8555,7 +9251,7 @@
         </p:nvSpPr>
         <p:spPr>
           <a:xfrm>
-            <a:off x="6033004" y="102915"/>
+            <a:off x="2426446" y="2427348"/>
             <a:ext cx="354154" cy="215444"/>
           </a:xfrm>
           <a:prstGeom prst="rect">
@@ -8585,7 +9281,7 @@
       </p:sp>
       <p:sp>
         <p:nvSpPr>
-          <p:cNvPr id="13" name="TextBox 230">
+          <p:cNvPr id="99" name="TextBox 230">
             <a:extLst>
               <a:ext uri="{FF2B5EF4-FFF2-40B4-BE49-F238E27FC236}">
                 <a16:creationId xmlns:a16="http://schemas.microsoft.com/office/drawing/2014/main" id="{8AF1D376-2A82-A44F-4F2C-5830FEE78451}"/>
@@ -8597,7 +9293,7 @@
         </p:nvSpPr>
         <p:spPr>
           <a:xfrm>
-            <a:off x="5481012" y="102915"/>
+            <a:off x="1874454" y="2427348"/>
             <a:ext cx="354154" cy="215444"/>
           </a:xfrm>
           <a:prstGeom prst="rect">
@@ -8627,7 +9323,7 @@
       </p:sp>
       <p:sp>
         <p:nvSpPr>
-          <p:cNvPr id="14" name="TextBox 231">
+          <p:cNvPr id="100" name="TextBox 231">
             <a:extLst>
               <a:ext uri="{FF2B5EF4-FFF2-40B4-BE49-F238E27FC236}">
                 <a16:creationId xmlns:a16="http://schemas.microsoft.com/office/drawing/2014/main" id="{28538DD9-DAB7-10B4-2328-9112FCBAC9B9}"/>
@@ -8639,7 +9335,7 @@
         </p:nvSpPr>
         <p:spPr>
           <a:xfrm>
-            <a:off x="4929020" y="102915"/>
+            <a:off x="1322462" y="2427348"/>
             <a:ext cx="354154" cy="215444"/>
           </a:xfrm>
           <a:prstGeom prst="rect">
@@ -8669,7 +9365,7 @@
       </p:sp>
       <p:sp>
         <p:nvSpPr>
-          <p:cNvPr id="15" name="TextBox 232">
+          <p:cNvPr id="101" name="TextBox 232">
             <a:extLst>
               <a:ext uri="{FF2B5EF4-FFF2-40B4-BE49-F238E27FC236}">
                 <a16:creationId xmlns:a16="http://schemas.microsoft.com/office/drawing/2014/main" id="{9F366357-E9B2-2CA5-1755-68B795391F73}"/>
@@ -8681,7 +9377,7 @@
         </p:nvSpPr>
         <p:spPr>
           <a:xfrm>
-            <a:off x="4377028" y="102915"/>
+            <a:off x="770470" y="2427348"/>
             <a:ext cx="354154" cy="215444"/>
           </a:xfrm>
           <a:prstGeom prst="rect">
@@ -8711,7 +9407,7 @@
       </p:sp>
       <p:sp>
         <p:nvSpPr>
-          <p:cNvPr id="16" name="TextBox 233">
+          <p:cNvPr id="102" name="TextBox 233">
             <a:extLst>
               <a:ext uri="{FF2B5EF4-FFF2-40B4-BE49-F238E27FC236}">
                 <a16:creationId xmlns:a16="http://schemas.microsoft.com/office/drawing/2014/main" id="{344C4B38-03CB-55F0-EA16-6F4270C3443B}"/>
@@ -8723,7 +9419,7 @@
         </p:nvSpPr>
         <p:spPr>
           <a:xfrm>
-            <a:off x="3825036" y="102915"/>
+            <a:off x="218478" y="2427348"/>
             <a:ext cx="354154" cy="215444"/>
           </a:xfrm>
           <a:prstGeom prst="rect">
@@ -8753,7 +9449,7 @@
       </p:sp>
       <p:sp>
         <p:nvSpPr>
-          <p:cNvPr id="17" name="TextBox 234">
+          <p:cNvPr id="103" name="TextBox 234">
             <a:extLst>
               <a:ext uri="{FF2B5EF4-FFF2-40B4-BE49-F238E27FC236}">
                 <a16:creationId xmlns:a16="http://schemas.microsoft.com/office/drawing/2014/main" id="{BAB5FA82-2A90-06EE-6258-9D203AB1BDB8}"/>
@@ -8765,7 +9461,7 @@
         </p:nvSpPr>
         <p:spPr>
           <a:xfrm>
-            <a:off x="5211421" y="-41647"/>
+            <a:off x="1604863" y="2282786"/>
             <a:ext cx="331811" cy="215444"/>
           </a:xfrm>
           <a:prstGeom prst="rect">
@@ -8794,7 +9490,7 @@
       </p:sp>
       <p:pic>
         <p:nvPicPr>
-          <p:cNvPr id="18" name="Picture 236" descr="A map of the united states&#10;&#10;Description automatically generated">
+          <p:cNvPr id="104" name="Picture 236" descr="A map of the united states&#10;&#10;Description automatically generated">
             <a:extLst>
               <a:ext uri="{FF2B5EF4-FFF2-40B4-BE49-F238E27FC236}">
                 <a16:creationId xmlns:a16="http://schemas.microsoft.com/office/drawing/2014/main" id="{1AB615E8-0B17-7B4A-E110-256F4C39CFC6}"/>
@@ -8819,7 +9515,7 @@
         </p:blipFill>
         <p:spPr>
           <a:xfrm>
-            <a:off x="268786" y="422493"/>
+            <a:off x="321891" y="455149"/>
             <a:ext cx="2927607" cy="1577839"/>
           </a:xfrm>
           <a:prstGeom prst="rect">
@@ -8836,7 +9532,7 @@
       </p:pic>
       <p:sp>
         <p:nvSpPr>
-          <p:cNvPr id="19" name="TextBox 237">
+          <p:cNvPr id="105" name="TextBox 237">
             <a:extLst>
               <a:ext uri="{FF2B5EF4-FFF2-40B4-BE49-F238E27FC236}">
                 <a16:creationId xmlns:a16="http://schemas.microsoft.com/office/drawing/2014/main" id="{B6871B03-CD01-1DE9-106B-BECB69B252AC}"/>
@@ -8848,7 +9544,7 @@
         </p:nvSpPr>
         <p:spPr>
           <a:xfrm>
-            <a:off x="-105958" y="117514"/>
+            <a:off x="-52853" y="150170"/>
             <a:ext cx="536815" cy="200055"/>
           </a:xfrm>
           <a:prstGeom prst="rect">
@@ -8878,7 +9574,7 @@
       </p:sp>
       <p:sp>
         <p:nvSpPr>
-          <p:cNvPr id="20" name="TextBox 238">
+          <p:cNvPr id="106" name="TextBox 238">
             <a:extLst>
               <a:ext uri="{FF2B5EF4-FFF2-40B4-BE49-F238E27FC236}">
                 <a16:creationId xmlns:a16="http://schemas.microsoft.com/office/drawing/2014/main" id="{ED01783E-4F4C-A8C9-3F22-8A910D6F8F90}"/>
@@ -8890,7 +9586,7 @@
         </p:nvSpPr>
         <p:spPr>
           <a:xfrm>
-            <a:off x="333428" y="117514"/>
+            <a:off x="386533" y="150170"/>
             <a:ext cx="570613" cy="200055"/>
           </a:xfrm>
           <a:prstGeom prst="rect">
@@ -8920,7 +9616,7 @@
       </p:sp>
       <p:sp>
         <p:nvSpPr>
-          <p:cNvPr id="21" name="TextBox 239">
+          <p:cNvPr id="107" name="TextBox 239">
             <a:extLst>
               <a:ext uri="{FF2B5EF4-FFF2-40B4-BE49-F238E27FC236}">
                 <a16:creationId xmlns:a16="http://schemas.microsoft.com/office/drawing/2014/main" id="{6ECAE385-D2E4-A5F8-D03D-40BE92503682}"/>
@@ -8932,7 +9628,7 @@
         </p:nvSpPr>
         <p:spPr>
           <a:xfrm>
-            <a:off x="806612" y="117514"/>
+            <a:off x="859717" y="150170"/>
             <a:ext cx="570613" cy="307777"/>
           </a:xfrm>
           <a:prstGeom prst="rect">
@@ -8975,7 +9671,7 @@
       </p:sp>
       <p:sp>
         <p:nvSpPr>
-          <p:cNvPr id="22" name="TextBox 240">
+          <p:cNvPr id="108" name="TextBox 240">
             <a:extLst>
               <a:ext uri="{FF2B5EF4-FFF2-40B4-BE49-F238E27FC236}">
                 <a16:creationId xmlns:a16="http://schemas.microsoft.com/office/drawing/2014/main" id="{377CE1CC-2AA5-9330-A970-BB92ACF08CEE}"/>
@@ -8987,7 +9683,7 @@
         </p:nvSpPr>
         <p:spPr>
           <a:xfrm>
-            <a:off x="1279796" y="117514"/>
+            <a:off x="1332901" y="150170"/>
             <a:ext cx="570613" cy="200055"/>
           </a:xfrm>
           <a:prstGeom prst="rect">
@@ -9017,7 +9713,7 @@
       </p:sp>
       <p:sp>
         <p:nvSpPr>
-          <p:cNvPr id="23" name="TextBox 241">
+          <p:cNvPr id="109" name="TextBox 241">
             <a:extLst>
               <a:ext uri="{FF2B5EF4-FFF2-40B4-BE49-F238E27FC236}">
                 <a16:creationId xmlns:a16="http://schemas.microsoft.com/office/drawing/2014/main" id="{89D16ACE-F790-DC3D-1B03-3F9F7A9E10BB}"/>
@@ -9029,7 +9725,7 @@
         </p:nvSpPr>
         <p:spPr>
           <a:xfrm>
-            <a:off x="1752980" y="117514"/>
+            <a:off x="1806085" y="150170"/>
             <a:ext cx="570613" cy="307777"/>
           </a:xfrm>
           <a:prstGeom prst="rect">
@@ -9072,7 +9768,7 @@
       </p:sp>
       <p:sp>
         <p:nvSpPr>
-          <p:cNvPr id="24" name="TextBox 242">
+          <p:cNvPr id="110" name="TextBox 242">
             <a:extLst>
               <a:ext uri="{FF2B5EF4-FFF2-40B4-BE49-F238E27FC236}">
                 <a16:creationId xmlns:a16="http://schemas.microsoft.com/office/drawing/2014/main" id="{BD98A7DA-E44F-537E-878D-920D528D2374}"/>
@@ -9084,7 +9780,7 @@
         </p:nvSpPr>
         <p:spPr>
           <a:xfrm>
-            <a:off x="2226164" y="117514"/>
+            <a:off x="2279269" y="150170"/>
             <a:ext cx="570613" cy="200055"/>
           </a:xfrm>
           <a:prstGeom prst="rect">
@@ -9114,7 +9810,7 @@
       </p:sp>
       <p:sp>
         <p:nvSpPr>
-          <p:cNvPr id="25" name="TextBox 243">
+          <p:cNvPr id="111" name="TextBox 243">
             <a:extLst>
               <a:ext uri="{FF2B5EF4-FFF2-40B4-BE49-F238E27FC236}">
                 <a16:creationId xmlns:a16="http://schemas.microsoft.com/office/drawing/2014/main" id="{D91A9B1A-3935-E2D1-6A45-A04DB53FA9AF}"/>
@@ -9126,7 +9822,7 @@
         </p:nvSpPr>
         <p:spPr>
           <a:xfrm>
-            <a:off x="2699347" y="117514"/>
+            <a:off x="2752452" y="150170"/>
             <a:ext cx="570613" cy="307777"/>
           </a:xfrm>
           <a:prstGeom prst="rect">
@@ -9156,7 +9852,7 @@
       </p:sp>
       <p:sp>
         <p:nvSpPr>
-          <p:cNvPr id="26" name="Rectangle 244">
+          <p:cNvPr id="112" name="Rectangle 244">
             <a:extLst>
               <a:ext uri="{FF2B5EF4-FFF2-40B4-BE49-F238E27FC236}">
                 <a16:creationId xmlns:a16="http://schemas.microsoft.com/office/drawing/2014/main" id="{FD0F6C0C-3187-59C2-B8AB-8CE80E69B405}"/>
@@ -9168,7 +9864,7 @@
         </p:nvSpPr>
         <p:spPr>
           <a:xfrm>
-            <a:off x="108449" y="41655"/>
+            <a:off x="161554" y="74311"/>
             <a:ext cx="108000" cy="108000"/>
           </a:xfrm>
           <a:prstGeom prst="rect">
@@ -9208,7 +9904,7 @@
       </p:sp>
       <p:sp>
         <p:nvSpPr>
-          <p:cNvPr id="27" name="Rectangle 245">
+          <p:cNvPr id="113" name="Rectangle 245">
             <a:extLst>
               <a:ext uri="{FF2B5EF4-FFF2-40B4-BE49-F238E27FC236}">
                 <a16:creationId xmlns:a16="http://schemas.microsoft.com/office/drawing/2014/main" id="{B9263D22-8B6B-1445-8A0C-5061E90D79EF}"/>
@@ -9220,7 +9916,7 @@
         </p:nvSpPr>
         <p:spPr>
           <a:xfrm>
-            <a:off x="564734" y="41655"/>
+            <a:off x="617839" y="74311"/>
             <a:ext cx="108000" cy="108000"/>
           </a:xfrm>
           <a:prstGeom prst="rect">
@@ -9260,7 +9956,7 @@
       </p:sp>
       <p:sp>
         <p:nvSpPr>
-          <p:cNvPr id="28" name="Rectangle 246">
+          <p:cNvPr id="114" name="Rectangle 246">
             <a:extLst>
               <a:ext uri="{FF2B5EF4-FFF2-40B4-BE49-F238E27FC236}">
                 <a16:creationId xmlns:a16="http://schemas.microsoft.com/office/drawing/2014/main" id="{734D8A0F-DA4D-8309-F970-E2530B211CA4}"/>
@@ -9272,7 +9968,7 @@
         </p:nvSpPr>
         <p:spPr>
           <a:xfrm>
-            <a:off x="1037918" y="41655"/>
+            <a:off x="1091023" y="74311"/>
             <a:ext cx="108000" cy="108000"/>
           </a:xfrm>
           <a:prstGeom prst="rect">
@@ -9312,7 +10008,7 @@
       </p:sp>
       <p:sp>
         <p:nvSpPr>
-          <p:cNvPr id="29" name="Rectangle 247">
+          <p:cNvPr id="115" name="Rectangle 247">
             <a:extLst>
               <a:ext uri="{FF2B5EF4-FFF2-40B4-BE49-F238E27FC236}">
                 <a16:creationId xmlns:a16="http://schemas.microsoft.com/office/drawing/2014/main" id="{D6D9CBDE-E9C7-3D16-96D4-8E67B270EAE3}"/>
@@ -9324,7 +10020,7 @@
         </p:nvSpPr>
         <p:spPr>
           <a:xfrm>
-            <a:off x="1511102" y="41655"/>
+            <a:off x="1564207" y="74311"/>
             <a:ext cx="108000" cy="108000"/>
           </a:xfrm>
           <a:prstGeom prst="rect">
@@ -9364,7 +10060,7 @@
       </p:sp>
       <p:sp>
         <p:nvSpPr>
-          <p:cNvPr id="30" name="Rectangle 248">
+          <p:cNvPr id="116" name="Rectangle 248">
             <a:extLst>
               <a:ext uri="{FF2B5EF4-FFF2-40B4-BE49-F238E27FC236}">
                 <a16:creationId xmlns:a16="http://schemas.microsoft.com/office/drawing/2014/main" id="{A7B8CD3B-CE6E-F022-E60D-BF8E98B05737}"/>
@@ -9376,7 +10072,7 @@
         </p:nvSpPr>
         <p:spPr>
           <a:xfrm>
-            <a:off x="1984286" y="41655"/>
+            <a:off x="2037391" y="74311"/>
             <a:ext cx="108000" cy="108000"/>
           </a:xfrm>
           <a:prstGeom prst="rect">
@@ -9416,7 +10112,7 @@
       </p:sp>
       <p:sp>
         <p:nvSpPr>
-          <p:cNvPr id="31" name="Rectangle 249">
+          <p:cNvPr id="117" name="Rectangle 249">
             <a:extLst>
               <a:ext uri="{FF2B5EF4-FFF2-40B4-BE49-F238E27FC236}">
                 <a16:creationId xmlns:a16="http://schemas.microsoft.com/office/drawing/2014/main" id="{3BA2A2CA-0B12-CD6C-AFDA-1197C74E9C14}"/>
@@ -9428,7 +10124,7 @@
         </p:nvSpPr>
         <p:spPr>
           <a:xfrm>
-            <a:off x="2457470" y="41655"/>
+            <a:off x="2510575" y="74311"/>
             <a:ext cx="108000" cy="108000"/>
           </a:xfrm>
           <a:prstGeom prst="rect">
@@ -9468,7 +10164,7 @@
       </p:sp>
       <p:sp>
         <p:nvSpPr>
-          <p:cNvPr id="32" name="Rectangle 250">
+          <p:cNvPr id="118" name="Rectangle 250">
             <a:extLst>
               <a:ext uri="{FF2B5EF4-FFF2-40B4-BE49-F238E27FC236}">
                 <a16:creationId xmlns:a16="http://schemas.microsoft.com/office/drawing/2014/main" id="{457BE35D-A1A5-58C6-2F5E-A07F0ABA918B}"/>
@@ -9480,7 +10176,7 @@
         </p:nvSpPr>
         <p:spPr>
           <a:xfrm>
-            <a:off x="2930653" y="41655"/>
+            <a:off x="2983758" y="74311"/>
             <a:ext cx="108000" cy="108000"/>
           </a:xfrm>
           <a:prstGeom prst="rect">
@@ -9520,7 +10216,7 @@
       </p:sp>
       <p:sp>
         <p:nvSpPr>
-          <p:cNvPr id="33" name="TextBox 251">
+          <p:cNvPr id="119" name="TextBox 251">
             <a:extLst>
               <a:ext uri="{FF2B5EF4-FFF2-40B4-BE49-F238E27FC236}">
                 <a16:creationId xmlns:a16="http://schemas.microsoft.com/office/drawing/2014/main" id="{3E807561-1BE6-323C-01CD-ACB63198B423}"/>
@@ -9532,7 +10228,7 @@
         </p:nvSpPr>
         <p:spPr>
           <a:xfrm>
-            <a:off x="3449758" y="422493"/>
+            <a:off x="-156800" y="2746926"/>
             <a:ext cx="536815" cy="215444"/>
           </a:xfrm>
           <a:prstGeom prst="rect">
@@ -9582,7 +10278,7 @@
       </p:sp>
       <p:sp>
         <p:nvSpPr>
-          <p:cNvPr id="34" name="TextBox 252">
+          <p:cNvPr id="120" name="TextBox 252">
             <a:extLst>
               <a:ext uri="{FF2B5EF4-FFF2-40B4-BE49-F238E27FC236}">
                 <a16:creationId xmlns:a16="http://schemas.microsoft.com/office/drawing/2014/main" id="{36CCD4FD-C539-D5EE-73D0-29235DA41DB6}"/>
@@ -9594,7 +10290,7 @@
         </p:nvSpPr>
         <p:spPr>
           <a:xfrm>
-            <a:off x="3449758" y="1020502"/>
+            <a:off x="-156800" y="3344935"/>
             <a:ext cx="536815" cy="215444"/>
           </a:xfrm>
           <a:prstGeom prst="rect">
@@ -9644,7 +10340,7 @@
       </p:sp>
       <p:sp>
         <p:nvSpPr>
-          <p:cNvPr id="35" name="TextBox 253">
+          <p:cNvPr id="121" name="TextBox 253">
             <a:extLst>
               <a:ext uri="{FF2B5EF4-FFF2-40B4-BE49-F238E27FC236}">
                 <a16:creationId xmlns:a16="http://schemas.microsoft.com/office/drawing/2014/main" id="{E464C751-1730-9A7E-ECC2-2153B2204BBA}"/>
@@ -9656,7 +10352,7 @@
         </p:nvSpPr>
         <p:spPr>
           <a:xfrm>
-            <a:off x="3449758" y="1534712"/>
+            <a:off x="-156800" y="3859145"/>
             <a:ext cx="536815" cy="215444"/>
           </a:xfrm>
           <a:prstGeom prst="rect">
@@ -9706,7 +10402,7 @@
       </p:sp>
       <p:sp>
         <p:nvSpPr>
-          <p:cNvPr id="36" name="TextBox 254">
+          <p:cNvPr id="122" name="TextBox 254">
             <a:extLst>
               <a:ext uri="{FF2B5EF4-FFF2-40B4-BE49-F238E27FC236}">
                 <a16:creationId xmlns:a16="http://schemas.microsoft.com/office/drawing/2014/main" id="{99BDB8A4-0494-689D-2507-94CDCEB8D0C2}"/>
@@ -9718,7 +10414,7 @@
         </p:nvSpPr>
         <p:spPr>
           <a:xfrm>
-            <a:off x="4054988" y="1972622"/>
+            <a:off x="448430" y="4297055"/>
             <a:ext cx="536815" cy="215444"/>
           </a:xfrm>
           <a:prstGeom prst="rect">
@@ -9768,7 +10464,7 @@
       </p:sp>
       <p:sp>
         <p:nvSpPr>
-          <p:cNvPr id="37" name="TextBox 255">
+          <p:cNvPr id="123" name="TextBox 255">
             <a:extLst>
               <a:ext uri="{FF2B5EF4-FFF2-40B4-BE49-F238E27FC236}">
                 <a16:creationId xmlns:a16="http://schemas.microsoft.com/office/drawing/2014/main" id="{22C4AD5E-E154-1EAD-C284-141D4E15EB00}"/>
@@ -9780,7 +10476,7 @@
         </p:nvSpPr>
         <p:spPr>
           <a:xfrm>
-            <a:off x="4891622" y="1972622"/>
+            <a:off x="1285064" y="4297055"/>
             <a:ext cx="536815" cy="215444"/>
           </a:xfrm>
           <a:prstGeom prst="rect">
@@ -9830,7 +10526,7 @@
       </p:sp>
       <p:sp>
         <p:nvSpPr>
-          <p:cNvPr id="38" name="TextBox 256">
+          <p:cNvPr id="124" name="TextBox 256">
             <a:extLst>
               <a:ext uri="{FF2B5EF4-FFF2-40B4-BE49-F238E27FC236}">
                 <a16:creationId xmlns:a16="http://schemas.microsoft.com/office/drawing/2014/main" id="{64644FAA-9682-8175-4D83-E0FAEBF5AECF}"/>
@@ -9842,7 +10538,7 @@
         </p:nvSpPr>
         <p:spPr>
           <a:xfrm>
-            <a:off x="5728256" y="1972622"/>
+            <a:off x="2121698" y="4297055"/>
             <a:ext cx="536815" cy="215444"/>
           </a:xfrm>
           <a:prstGeom prst="rect">
@@ -9892,7 +10588,7 @@
       </p:sp>
       <p:sp>
         <p:nvSpPr>
-          <p:cNvPr id="39" name="TextBox 258">
+          <p:cNvPr id="125" name="TextBox 258">
             <a:extLst>
               <a:ext uri="{FF2B5EF4-FFF2-40B4-BE49-F238E27FC236}">
                 <a16:creationId xmlns:a16="http://schemas.microsoft.com/office/drawing/2014/main" id="{F606AFF2-A448-29EC-8740-4E64AAE7AB72}"/>
@@ -9904,7 +10600,7 @@
         </p:nvSpPr>
         <p:spPr>
           <a:xfrm>
-            <a:off x="2917168" y="1723966"/>
+            <a:off x="2970273" y="1756622"/>
             <a:ext cx="224268" cy="215444"/>
           </a:xfrm>
           <a:prstGeom prst="rect">
@@ -9943,7 +10639,7 @@
       </p:sp>
       <p:sp>
         <p:nvSpPr>
-          <p:cNvPr id="40" name="TextBox 259">
+          <p:cNvPr id="126" name="TextBox 259">
             <a:extLst>
               <a:ext uri="{FF2B5EF4-FFF2-40B4-BE49-F238E27FC236}">
                 <a16:creationId xmlns:a16="http://schemas.microsoft.com/office/drawing/2014/main" id="{47CED736-C2A1-36CE-3DF2-F463782B7FF3}"/>
@@ -9955,7 +10651,7 @@
         </p:nvSpPr>
         <p:spPr>
           <a:xfrm>
-            <a:off x="6543246" y="1723966"/>
+            <a:off x="2936688" y="4048399"/>
             <a:ext cx="224268" cy="215444"/>
           </a:xfrm>
           <a:prstGeom prst="rect">
@@ -9994,7 +10690,7 @@
       </p:sp>
       <p:sp>
         <p:nvSpPr>
-          <p:cNvPr id="41" name="TextBox 260">
+          <p:cNvPr id="127" name="TextBox 260">
             <a:extLst>
               <a:ext uri="{FF2B5EF4-FFF2-40B4-BE49-F238E27FC236}">
                 <a16:creationId xmlns:a16="http://schemas.microsoft.com/office/drawing/2014/main" id="{59215346-0A39-CC39-D2D8-603954054EC6}"/>
@@ -10006,7 +10702,7 @@
         </p:nvSpPr>
         <p:spPr>
           <a:xfrm>
-            <a:off x="4101032" y="102915"/>
+            <a:off x="494474" y="2427348"/>
             <a:ext cx="354154" cy="215444"/>
           </a:xfrm>
           <a:prstGeom prst="rect">
@@ -10036,7 +10732,7 @@
       </p:sp>
       <p:sp>
         <p:nvSpPr>
-          <p:cNvPr id="42" name="TextBox 261">
+          <p:cNvPr id="128" name="TextBox 261">
             <a:extLst>
               <a:ext uri="{FF2B5EF4-FFF2-40B4-BE49-F238E27FC236}">
                 <a16:creationId xmlns:a16="http://schemas.microsoft.com/office/drawing/2014/main" id="{C7F77EE4-03F2-CE29-7AAC-D2E58CAD0D6F}"/>
@@ -10048,7 +10744,7 @@
         </p:nvSpPr>
         <p:spPr>
           <a:xfrm>
-            <a:off x="4653024" y="102915"/>
+            <a:off x="1046466" y="2427348"/>
             <a:ext cx="354154" cy="215444"/>
           </a:xfrm>
           <a:prstGeom prst="rect">
@@ -10078,7 +10774,7 @@
       </p:sp>
       <p:sp>
         <p:nvSpPr>
-          <p:cNvPr id="43" name="TextBox 262">
+          <p:cNvPr id="129" name="TextBox 262">
             <a:extLst>
               <a:ext uri="{FF2B5EF4-FFF2-40B4-BE49-F238E27FC236}">
                 <a16:creationId xmlns:a16="http://schemas.microsoft.com/office/drawing/2014/main" id="{858257CA-1ABF-6E30-7CB5-A356C4E21C51}"/>
@@ -10090,7 +10786,7 @@
         </p:nvSpPr>
         <p:spPr>
           <a:xfrm>
-            <a:off x="5205016" y="102915"/>
+            <a:off x="1598458" y="2427348"/>
             <a:ext cx="354154" cy="215444"/>
           </a:xfrm>
           <a:prstGeom prst="rect">
@@ -10120,7 +10816,7 @@
       </p:sp>
       <p:sp>
         <p:nvSpPr>
-          <p:cNvPr id="44" name="TextBox 263">
+          <p:cNvPr id="130" name="TextBox 263">
             <a:extLst>
               <a:ext uri="{FF2B5EF4-FFF2-40B4-BE49-F238E27FC236}">
                 <a16:creationId xmlns:a16="http://schemas.microsoft.com/office/drawing/2014/main" id="{C9DC7499-5DE0-F436-0A8B-A070DEA8096C}"/>
@@ -10132,7 +10828,7 @@
         </p:nvSpPr>
         <p:spPr>
           <a:xfrm>
-            <a:off x="5757008" y="102915"/>
+            <a:off x="2150450" y="2427348"/>
             <a:ext cx="354154" cy="215444"/>
           </a:xfrm>
           <a:prstGeom prst="rect">
@@ -10162,7 +10858,7 @@
       </p:sp>
       <p:sp>
         <p:nvSpPr>
-          <p:cNvPr id="45" name="TextBox 264">
+          <p:cNvPr id="131" name="TextBox 264">
             <a:extLst>
               <a:ext uri="{FF2B5EF4-FFF2-40B4-BE49-F238E27FC236}">
                 <a16:creationId xmlns:a16="http://schemas.microsoft.com/office/drawing/2014/main" id="{ECD1FCB4-C01C-4739-8CFD-EEF0675DC2CE}"/>
@@ -10174,7 +10870,7 @@
         </p:nvSpPr>
         <p:spPr>
           <a:xfrm>
-            <a:off x="6309000" y="102915"/>
+            <a:off x="2702442" y="2427348"/>
             <a:ext cx="354154" cy="215444"/>
           </a:xfrm>
           <a:prstGeom prst="rect">

</xml_diff>